<commit_message>
doc: PPT do Gerson atualizado e mapa de empatia
</commit_message>
<xml_diff>
--- a/Documentação/EngenhariaDeSoftware/Sprint1-Engenharia-de-Software.pptx
+++ b/Documentação/EngenhariaDeSoftware/Sprint1-Engenharia-de-Software.pptx
@@ -25,8 +25,8 @@
     <p:sldId id="601" r:id="rId16"/>
     <p:sldId id="574" r:id="rId17"/>
     <p:sldId id="625" r:id="rId18"/>
-    <p:sldId id="605" r:id="rId19"/>
-    <p:sldId id="636" r:id="rId20"/>
+    <p:sldId id="636" r:id="rId19"/>
+    <p:sldId id="605" r:id="rId20"/>
     <p:sldId id="600" r:id="rId21"/>
     <p:sldId id="627" r:id="rId22"/>
   </p:sldIdLst>
@@ -2278,7 +2278,7 @@
             <a:fld id="{C3CD65D1-5C11-455D-9F9A-0E035F00A0DA}" type="datetimeFigureOut">
               <a:rPr lang="pt-BR" smtClean="0"/>
               <a:pPr/>
-              <a:t>17/08/2021</a:t>
+              <a:t>31/08/2021</a:t>
             </a:fld>
             <a:endParaRPr lang="pt-BR"/>
           </a:p>
@@ -2446,7 +2446,7 @@
             <a:fld id="{A05DA3EF-18EA-43DE-B1BB-402A3C558822}" type="datetimeFigureOut">
               <a:rPr lang="pt-BR" smtClean="0"/>
               <a:pPr/>
-              <a:t>17/08/2021</a:t>
+              <a:t>31/08/2021</a:t>
             </a:fld>
             <a:endParaRPr lang="pt-BR"/>
           </a:p>
@@ -13128,10 +13128,10 @@
       </p:sp>
       <p:pic>
         <p:nvPicPr>
-          <p:cNvPr id="10" name="Imagem 9" descr="Uma imagem contendo texto, mapa&#10;&#10;Descrição gerada automaticamente">
+          <p:cNvPr id="7" name="Imagem 6" descr="Diagrama&#10;&#10;Descrição gerada automaticamente com confiança baixa">
             <a:extLst>
               <a:ext uri="{FF2B5EF4-FFF2-40B4-BE49-F238E27FC236}">
-                <a16:creationId xmlns:a16="http://schemas.microsoft.com/office/drawing/2014/main" id="{B94BA9D3-7AD4-41E3-BFAD-B5A22B305A1B}"/>
+                <a16:creationId xmlns:a16="http://schemas.microsoft.com/office/drawing/2014/main" id="{2FF4E62E-66C4-4099-9486-2E827AF8BE56}"/>
               </a:ext>
             </a:extLst>
           </p:cNvPr>
@@ -13141,10 +13141,10 @@
           <p:nvPr/>
         </p:nvPicPr>
         <p:blipFill>
-          <a:blip r:embed="rId2" cstate="email">
+          <a:blip r:embed="rId2" cstate="print">
             <a:extLst>
               <a:ext uri="{28A0092B-C50C-407E-A947-70E740481C1C}">
-                <a14:useLocalDpi xmlns:a14="http://schemas.microsoft.com/office/drawing/2010/main"/>
+                <a14:useLocalDpi xmlns:a14="http://schemas.microsoft.com/office/drawing/2010/main" val="0"/>
               </a:ext>
             </a:extLst>
           </a:blip>
@@ -13154,476 +13154,18 @@
         </p:blipFill>
         <p:spPr>
           <a:xfrm>
-            <a:off x="1885291" y="666118"/>
-            <a:ext cx="9672368" cy="6838260"/>
+            <a:off x="3483296" y="653003"/>
+            <a:ext cx="6476358" cy="6908260"/>
           </a:xfrm>
           <a:prstGeom prst="rect">
             <a:avLst/>
           </a:prstGeom>
         </p:spPr>
       </p:pic>
-      <p:sp>
-        <p:nvSpPr>
-          <p:cNvPr id="5" name="CaixaDeTexto 4">
-            <a:extLst>
-              <a:ext uri="{FF2B5EF4-FFF2-40B4-BE49-F238E27FC236}">
-                <a16:creationId xmlns:a16="http://schemas.microsoft.com/office/drawing/2014/main" id="{C683460F-48B9-414D-A762-A7BAEA66A3A5}"/>
-              </a:ext>
-            </a:extLst>
-          </p:cNvPr>
-          <p:cNvSpPr txBox="1"/>
-          <p:nvPr/>
-        </p:nvSpPr>
-        <p:spPr>
-          <a:xfrm>
-            <a:off x="2211243" y="2746759"/>
-            <a:ext cx="2944967" cy="2031325"/>
-          </a:xfrm>
-          <a:prstGeom prst="rect">
-            <a:avLst/>
-          </a:prstGeom>
-          <a:noFill/>
-        </p:spPr>
-        <p:txBody>
-          <a:bodyPr wrap="square" rtlCol="0">
-            <a:spAutoFit/>
-          </a:bodyPr>
-          <a:lstStyle/>
-          <a:p>
-            <a:pPr algn="just"/>
-            <a:r>
-              <a:rPr lang="pt-BR" sz="1800" dirty="0"/>
-              <a:t>- Registrar os livros em papel      é chato;</a:t>
-            </a:r>
-          </a:p>
-          <a:p>
-            <a:pPr algn="just"/>
-            <a:r>
-              <a:rPr lang="pt-BR" sz="1800" dirty="0"/>
-              <a:t>- É difícil encontrar livros específicos;</a:t>
-            </a:r>
-          </a:p>
-          <a:p>
-            <a:pPr algn="just"/>
-            <a:r>
-              <a:rPr lang="pt-BR" sz="1800" dirty="0"/>
-              <a:t>- Usar papel para organizar algo está ultrapassado;</a:t>
-            </a:r>
-          </a:p>
-          <a:p>
-            <a:pPr algn="just"/>
-            <a:r>
-              <a:rPr lang="pt-BR" sz="1800" dirty="0"/>
-              <a:t>- Ambiente agradável.</a:t>
-            </a:r>
-          </a:p>
-        </p:txBody>
-      </p:sp>
-      <p:sp>
-        <p:nvSpPr>
-          <p:cNvPr id="7" name="CaixaDeTexto 6">
-            <a:extLst>
-              <a:ext uri="{FF2B5EF4-FFF2-40B4-BE49-F238E27FC236}">
-                <a16:creationId xmlns:a16="http://schemas.microsoft.com/office/drawing/2014/main" id="{1136ECD9-4C6E-4968-8D49-EDC3FED4C016}"/>
-              </a:ext>
-            </a:extLst>
-          </p:cNvPr>
-          <p:cNvSpPr txBox="1"/>
-          <p:nvPr/>
-        </p:nvSpPr>
-        <p:spPr>
-          <a:xfrm>
-            <a:off x="3130586" y="666118"/>
-            <a:ext cx="1425844" cy="415498"/>
-          </a:xfrm>
-          <a:prstGeom prst="rect">
-            <a:avLst/>
-          </a:prstGeom>
-          <a:noFill/>
-        </p:spPr>
-        <p:txBody>
-          <a:bodyPr wrap="square" rtlCol="0">
-            <a:spAutoFit/>
-          </a:bodyPr>
-          <a:lstStyle/>
-          <a:p>
-            <a:r>
-              <a:rPr lang="pt-BR" dirty="0"/>
-              <a:t>Gabriel</a:t>
-            </a:r>
-          </a:p>
-        </p:txBody>
-      </p:sp>
-      <p:sp>
-        <p:nvSpPr>
-          <p:cNvPr id="9" name="CaixaDeTexto 8">
-            <a:extLst>
-              <a:ext uri="{FF2B5EF4-FFF2-40B4-BE49-F238E27FC236}">
-                <a16:creationId xmlns:a16="http://schemas.microsoft.com/office/drawing/2014/main" id="{DFBAC321-31B5-4144-8CD5-467771AB6953}"/>
-              </a:ext>
-            </a:extLst>
-          </p:cNvPr>
-          <p:cNvSpPr txBox="1"/>
-          <p:nvPr/>
-        </p:nvSpPr>
-        <p:spPr>
-          <a:xfrm>
-            <a:off x="5502043" y="691003"/>
-            <a:ext cx="588646" cy="415498"/>
-          </a:xfrm>
-          <a:prstGeom prst="rect">
-            <a:avLst/>
-          </a:prstGeom>
-          <a:noFill/>
-        </p:spPr>
-        <p:txBody>
-          <a:bodyPr wrap="square" rtlCol="0">
-            <a:spAutoFit/>
-          </a:bodyPr>
-          <a:lstStyle/>
-          <a:p>
-            <a:r>
-              <a:rPr lang="pt-BR" dirty="0"/>
-              <a:t>20</a:t>
-            </a:r>
-          </a:p>
-        </p:txBody>
-      </p:sp>
-      <p:sp>
-        <p:nvSpPr>
-          <p:cNvPr id="8" name="CaixaDeTexto 7">
-            <a:extLst>
-              <a:ext uri="{FF2B5EF4-FFF2-40B4-BE49-F238E27FC236}">
-                <a16:creationId xmlns:a16="http://schemas.microsoft.com/office/drawing/2014/main" id="{E391E087-EB8E-4F0B-A6E1-17939F4D916A}"/>
-              </a:ext>
-            </a:extLst>
-          </p:cNvPr>
-          <p:cNvSpPr txBox="1"/>
-          <p:nvPr/>
-        </p:nvSpPr>
-        <p:spPr>
-          <a:xfrm>
-            <a:off x="4788216" y="1174615"/>
-            <a:ext cx="4024707" cy="1708160"/>
-          </a:xfrm>
-          <a:prstGeom prst="rect">
-            <a:avLst/>
-          </a:prstGeom>
-          <a:noFill/>
-        </p:spPr>
-        <p:txBody>
-          <a:bodyPr wrap="square" rtlCol="0">
-            <a:spAutoFit/>
-          </a:bodyPr>
-          <a:lstStyle/>
-          <a:p>
-            <a:r>
-              <a:rPr lang="pt-BR" dirty="0"/>
-              <a:t>-    Preguiça em procurar livro;</a:t>
-            </a:r>
-          </a:p>
-          <a:p>
-            <a:pPr marL="342900" indent="-342900">
-              <a:buFontTx/>
-              <a:buChar char="-"/>
-            </a:pPr>
-            <a:r>
-              <a:rPr lang="pt-BR" dirty="0"/>
-              <a:t>Falta de organização para reservar algum livro;</a:t>
-            </a:r>
-          </a:p>
-          <a:p>
-            <a:pPr marL="342900" indent="-342900">
-              <a:buFontTx/>
-              <a:buChar char="-"/>
-            </a:pPr>
-            <a:r>
-              <a:rPr lang="pt-BR" dirty="0"/>
-              <a:t>Percepção de ter poucos livros</a:t>
-            </a:r>
-          </a:p>
-          <a:p>
-            <a:pPr marL="342900" indent="-342900">
-              <a:buFontTx/>
-              <a:buChar char="-"/>
-            </a:pPr>
-            <a:endParaRPr lang="pt-BR" dirty="0"/>
-          </a:p>
-        </p:txBody>
-      </p:sp>
-      <p:sp>
-        <p:nvSpPr>
-          <p:cNvPr id="11" name="CaixaDeTexto 10">
-            <a:extLst>
-              <a:ext uri="{FF2B5EF4-FFF2-40B4-BE49-F238E27FC236}">
-                <a16:creationId xmlns:a16="http://schemas.microsoft.com/office/drawing/2014/main" id="{0779BBA0-891E-44B8-8C0D-EC0CA6A54CB3}"/>
-              </a:ext>
-            </a:extLst>
-          </p:cNvPr>
-          <p:cNvSpPr txBox="1"/>
-          <p:nvPr/>
-        </p:nvSpPr>
-        <p:spPr>
-          <a:xfrm>
-            <a:off x="8756253" y="2364310"/>
-            <a:ext cx="2944967" cy="2354491"/>
-          </a:xfrm>
-          <a:prstGeom prst="rect">
-            <a:avLst/>
-          </a:prstGeom>
-          <a:noFill/>
-        </p:spPr>
-        <p:txBody>
-          <a:bodyPr wrap="square" rtlCol="0">
-            <a:spAutoFit/>
-          </a:bodyPr>
-          <a:lstStyle/>
-          <a:p>
-            <a:r>
-              <a:rPr lang="pt-BR" dirty="0"/>
-              <a:t>- Videoaulas de conteúdos sobre tecnologia;</a:t>
-            </a:r>
-          </a:p>
-          <a:p>
-            <a:r>
-              <a:rPr lang="pt-BR" dirty="0"/>
-              <a:t>- Informações sobre as principais linguagens do mercado;</a:t>
-            </a:r>
-          </a:p>
-          <a:p>
-            <a:r>
-              <a:rPr lang="pt-BR" dirty="0"/>
-              <a:t>- Conteúdos do trabalho.</a:t>
-            </a:r>
-          </a:p>
-        </p:txBody>
-      </p:sp>
-      <p:sp>
-        <p:nvSpPr>
-          <p:cNvPr id="12" name="CaixaDeTexto 11">
-            <a:extLst>
-              <a:ext uri="{FF2B5EF4-FFF2-40B4-BE49-F238E27FC236}">
-                <a16:creationId xmlns:a16="http://schemas.microsoft.com/office/drawing/2014/main" id="{A14527D4-8C0C-46C8-ABED-99913844FCFC}"/>
-              </a:ext>
-            </a:extLst>
-          </p:cNvPr>
-          <p:cNvSpPr txBox="1"/>
-          <p:nvPr/>
-        </p:nvSpPr>
-        <p:spPr>
-          <a:xfrm>
-            <a:off x="5796366" y="5145437"/>
-            <a:ext cx="184731" cy="415498"/>
-          </a:xfrm>
-          <a:prstGeom prst="rect">
-            <a:avLst/>
-          </a:prstGeom>
-          <a:noFill/>
-        </p:spPr>
-        <p:txBody>
-          <a:bodyPr wrap="none" rtlCol="0">
-            <a:spAutoFit/>
-          </a:bodyPr>
-          <a:lstStyle/>
-          <a:p>
-            <a:endParaRPr lang="pt-BR" dirty="0"/>
-          </a:p>
-        </p:txBody>
-      </p:sp>
-      <p:sp>
-        <p:nvSpPr>
-          <p:cNvPr id="13" name="CaixaDeTexto 12">
-            <a:extLst>
-              <a:ext uri="{FF2B5EF4-FFF2-40B4-BE49-F238E27FC236}">
-                <a16:creationId xmlns:a16="http://schemas.microsoft.com/office/drawing/2014/main" id="{B8298643-45F7-48C6-A98E-A95E637B371E}"/>
-              </a:ext>
-            </a:extLst>
-          </p:cNvPr>
-          <p:cNvSpPr txBox="1"/>
-          <p:nvPr/>
-        </p:nvSpPr>
-        <p:spPr>
-          <a:xfrm>
-            <a:off x="4731546" y="4778084"/>
-            <a:ext cx="4024707" cy="1523494"/>
-          </a:xfrm>
-          <a:prstGeom prst="rect">
-            <a:avLst/>
-          </a:prstGeom>
-          <a:noFill/>
-        </p:spPr>
-        <p:txBody>
-          <a:bodyPr wrap="square" rtlCol="0">
-            <a:spAutoFit/>
-          </a:bodyPr>
-          <a:lstStyle/>
-          <a:p>
-            <a:pPr marL="342900" indent="-342900">
-              <a:buFontTx/>
-              <a:buChar char="-"/>
-            </a:pPr>
-            <a:r>
-              <a:rPr lang="pt-BR" sz="1800" dirty="0"/>
-              <a:t>Fala sobre novas tecnologias</a:t>
-            </a:r>
-          </a:p>
-          <a:p>
-            <a:pPr marL="342900" indent="-342900">
-              <a:buFontTx/>
-              <a:buChar char="-"/>
-            </a:pPr>
-            <a:r>
-              <a:rPr lang="pt-BR" sz="1800" dirty="0"/>
-              <a:t>Fala sobre jogos;</a:t>
-            </a:r>
-          </a:p>
-          <a:p>
-            <a:pPr marL="342900" indent="-342900">
-              <a:buFontTx/>
-              <a:buChar char="-"/>
-            </a:pPr>
-            <a:r>
-              <a:rPr lang="pt-BR" sz="1800" dirty="0"/>
-              <a:t>Faz estágio;</a:t>
-            </a:r>
-          </a:p>
-          <a:p>
-            <a:r>
-              <a:rPr lang="pt-BR" sz="1800" dirty="0"/>
-              <a:t>-    Estuda;</a:t>
-            </a:r>
-          </a:p>
-          <a:p>
-            <a:pPr marL="342900" indent="-342900">
-              <a:buFontTx/>
-              <a:buChar char="-"/>
-            </a:pPr>
-            <a:endParaRPr lang="pt-BR" dirty="0"/>
-          </a:p>
-        </p:txBody>
-      </p:sp>
-      <p:sp>
-        <p:nvSpPr>
-          <p:cNvPr id="2" name="CaixaDeTexto 1">
-            <a:extLst>
-              <a:ext uri="{FF2B5EF4-FFF2-40B4-BE49-F238E27FC236}">
-                <a16:creationId xmlns:a16="http://schemas.microsoft.com/office/drawing/2014/main" id="{83A8FD08-5ED0-4696-B8AF-DFF0FF72C84B}"/>
-              </a:ext>
-            </a:extLst>
-          </p:cNvPr>
-          <p:cNvSpPr txBox="1"/>
-          <p:nvPr/>
-        </p:nvSpPr>
-        <p:spPr>
-          <a:xfrm>
-            <a:off x="2357195" y="6281956"/>
-            <a:ext cx="3824870" cy="1061829"/>
-          </a:xfrm>
-          <a:prstGeom prst="rect">
-            <a:avLst/>
-          </a:prstGeom>
-          <a:noFill/>
-        </p:spPr>
-        <p:txBody>
-          <a:bodyPr wrap="square" rtlCol="0">
-            <a:spAutoFit/>
-          </a:bodyPr>
-          <a:lstStyle/>
-          <a:p>
-            <a:pPr marL="342900" indent="-342900">
-              <a:buFontTx/>
-              <a:buChar char="-"/>
-            </a:pPr>
-            <a:r>
-              <a:rPr lang="pt-BR" dirty="0"/>
-              <a:t>Tempo livre escasso;</a:t>
-            </a:r>
-          </a:p>
-          <a:p>
-            <a:pPr marL="342900" indent="-342900">
-              <a:buFontTx/>
-              <a:buChar char="-"/>
-            </a:pPr>
-            <a:r>
-              <a:rPr lang="pt-BR" dirty="0"/>
-              <a:t>Cansaço físico;</a:t>
-            </a:r>
-          </a:p>
-          <a:p>
-            <a:pPr marL="342900" indent="-342900">
-              <a:buFontTx/>
-              <a:buChar char="-"/>
-            </a:pPr>
-            <a:r>
-              <a:rPr lang="pt-BR" dirty="0"/>
-              <a:t>Organização</a:t>
-            </a:r>
-          </a:p>
-        </p:txBody>
-      </p:sp>
-      <p:sp>
-        <p:nvSpPr>
-          <p:cNvPr id="6" name="CaixaDeTexto 5">
-            <a:extLst>
-              <a:ext uri="{FF2B5EF4-FFF2-40B4-BE49-F238E27FC236}">
-                <a16:creationId xmlns:a16="http://schemas.microsoft.com/office/drawing/2014/main" id="{780F0561-FAAB-4796-A6AE-54239DEF790F}"/>
-              </a:ext>
-            </a:extLst>
-          </p:cNvPr>
-          <p:cNvSpPr txBox="1"/>
-          <p:nvPr/>
-        </p:nvSpPr>
-        <p:spPr>
-          <a:xfrm>
-            <a:off x="6909389" y="6209244"/>
-            <a:ext cx="4367167" cy="1061829"/>
-          </a:xfrm>
-          <a:prstGeom prst="rect">
-            <a:avLst/>
-          </a:prstGeom>
-          <a:noFill/>
-        </p:spPr>
-        <p:txBody>
-          <a:bodyPr wrap="square" rtlCol="0">
-            <a:spAutoFit/>
-          </a:bodyPr>
-          <a:lstStyle/>
-          <a:p>
-            <a:pPr marL="342900" indent="-342900">
-              <a:buFontTx/>
-              <a:buChar char="-"/>
-            </a:pPr>
-            <a:r>
-              <a:rPr lang="pt-BR" dirty="0"/>
-              <a:t>Maior praticidade no dia a dia;</a:t>
-            </a:r>
-          </a:p>
-          <a:p>
-            <a:pPr marL="342900" indent="-342900">
-              <a:buFontTx/>
-              <a:buChar char="-"/>
-            </a:pPr>
-            <a:r>
-              <a:rPr lang="pt-BR" dirty="0"/>
-              <a:t>Facilidade de organização;</a:t>
-            </a:r>
-          </a:p>
-          <a:p>
-            <a:pPr marL="342900" indent="-342900">
-              <a:buFontTx/>
-              <a:buChar char="-"/>
-            </a:pPr>
-            <a:r>
-              <a:rPr lang="pt-BR" dirty="0"/>
-              <a:t>Encontrar variedades de conteúdo.</a:t>
-            </a:r>
-          </a:p>
-        </p:txBody>
-      </p:sp>
     </p:spTree>
     <p:extLst>
       <p:ext uri="{BB962C8B-B14F-4D97-AF65-F5344CB8AC3E}">
-        <p14:creationId xmlns:p14="http://schemas.microsoft.com/office/powerpoint/2010/main" val="446769231"/>
+        <p14:creationId xmlns:p14="http://schemas.microsoft.com/office/powerpoint/2010/main" val="1667650881"/>
       </p:ext>
     </p:extLst>
   </p:cSld>
@@ -13701,12 +13243,44 @@
           </a:p>
         </p:txBody>
       </p:sp>
+      <p:sp>
+        <p:nvSpPr>
+          <p:cNvPr id="12" name="CaixaDeTexto 11">
+            <a:extLst>
+              <a:ext uri="{FF2B5EF4-FFF2-40B4-BE49-F238E27FC236}">
+                <a16:creationId xmlns:a16="http://schemas.microsoft.com/office/drawing/2014/main" id="{A14527D4-8C0C-46C8-ABED-99913844FCFC}"/>
+              </a:ext>
+            </a:extLst>
+          </p:cNvPr>
+          <p:cNvSpPr txBox="1"/>
+          <p:nvPr/>
+        </p:nvSpPr>
+        <p:spPr>
+          <a:xfrm>
+            <a:off x="5796366" y="5145437"/>
+            <a:ext cx="184731" cy="415498"/>
+          </a:xfrm>
+          <a:prstGeom prst="rect">
+            <a:avLst/>
+          </a:prstGeom>
+          <a:noFill/>
+        </p:spPr>
+        <p:txBody>
+          <a:bodyPr wrap="none" rtlCol="0">
+            <a:spAutoFit/>
+          </a:bodyPr>
+          <a:lstStyle/>
+          <a:p>
+            <a:endParaRPr lang="pt-BR" dirty="0"/>
+          </a:p>
+        </p:txBody>
+      </p:sp>
       <p:pic>
         <p:nvPicPr>
-          <p:cNvPr id="10" name="Imagem 9" descr="Uma imagem contendo texto, mapa&#10;&#10;Descrição gerada automaticamente">
+          <p:cNvPr id="15" name="Imagem 14" descr="Diagrama&#10;&#10;Descrição gerada automaticamente">
             <a:extLst>
               <a:ext uri="{FF2B5EF4-FFF2-40B4-BE49-F238E27FC236}">
-                <a16:creationId xmlns:a16="http://schemas.microsoft.com/office/drawing/2014/main" id="{B94BA9D3-7AD4-41E3-BFAD-B5A22B305A1B}"/>
+                <a16:creationId xmlns:a16="http://schemas.microsoft.com/office/drawing/2014/main" id="{28858A20-B7EC-4636-83D6-2BF4664599C5}"/>
               </a:ext>
             </a:extLst>
           </p:cNvPr>
@@ -13716,10 +13290,10 @@
           <p:nvPr/>
         </p:nvPicPr>
         <p:blipFill>
-          <a:blip r:embed="rId2" cstate="email">
+          <a:blip r:embed="rId2" cstate="print">
             <a:extLst>
               <a:ext uri="{28A0092B-C50C-407E-A947-70E740481C1C}">
-                <a14:useLocalDpi xmlns:a14="http://schemas.microsoft.com/office/drawing/2010/main"/>
+                <a14:useLocalDpi xmlns:a14="http://schemas.microsoft.com/office/drawing/2010/main" val="0"/>
               </a:ext>
             </a:extLst>
           </a:blip>
@@ -13729,88 +13303,18 @@
         </p:blipFill>
         <p:spPr>
           <a:xfrm>
-            <a:off x="1841736" y="794123"/>
-            <a:ext cx="9416242" cy="6657182"/>
+            <a:off x="3389371" y="634199"/>
+            <a:ext cx="6664208" cy="6842484"/>
           </a:xfrm>
           <a:prstGeom prst="rect">
             <a:avLst/>
           </a:prstGeom>
         </p:spPr>
       </p:pic>
-      <p:sp>
-        <p:nvSpPr>
-          <p:cNvPr id="2" name="CaixaDeTexto 1">
-            <a:extLst>
-              <a:ext uri="{FF2B5EF4-FFF2-40B4-BE49-F238E27FC236}">
-                <a16:creationId xmlns:a16="http://schemas.microsoft.com/office/drawing/2014/main" id="{97A81F11-A107-4DC6-A920-E9D32CB7F82C}"/>
-              </a:ext>
-            </a:extLst>
-          </p:cNvPr>
-          <p:cNvSpPr txBox="1"/>
-          <p:nvPr/>
-        </p:nvSpPr>
-        <p:spPr>
-          <a:xfrm>
-            <a:off x="2836189" y="794123"/>
-            <a:ext cx="1642821" cy="415498"/>
-          </a:xfrm>
-          <a:prstGeom prst="rect">
-            <a:avLst/>
-          </a:prstGeom>
-          <a:noFill/>
-        </p:spPr>
-        <p:txBody>
-          <a:bodyPr wrap="square" rtlCol="0">
-            <a:spAutoFit/>
-          </a:bodyPr>
-          <a:lstStyle/>
-          <a:p>
-            <a:r>
-              <a:rPr lang="pt-BR" dirty="0"/>
-              <a:t>Carlos</a:t>
-            </a:r>
-          </a:p>
-        </p:txBody>
-      </p:sp>
-      <p:sp>
-        <p:nvSpPr>
-          <p:cNvPr id="6" name="CaixaDeTexto 5">
-            <a:extLst>
-              <a:ext uri="{FF2B5EF4-FFF2-40B4-BE49-F238E27FC236}">
-                <a16:creationId xmlns:a16="http://schemas.microsoft.com/office/drawing/2014/main" id="{A9C77685-0D04-405F-A4D6-4121CD4AE949}"/>
-              </a:ext>
-            </a:extLst>
-          </p:cNvPr>
-          <p:cNvSpPr txBox="1"/>
-          <p:nvPr/>
-        </p:nvSpPr>
-        <p:spPr>
-          <a:xfrm>
-            <a:off x="5339027" y="833995"/>
-            <a:ext cx="689813" cy="415498"/>
-          </a:xfrm>
-          <a:prstGeom prst="rect">
-            <a:avLst/>
-          </a:prstGeom>
-          <a:noFill/>
-        </p:spPr>
-        <p:txBody>
-          <a:bodyPr wrap="square" rtlCol="0">
-            <a:spAutoFit/>
-          </a:bodyPr>
-          <a:lstStyle/>
-          <a:p>
-            <a:r>
-              <a:rPr lang="pt-BR" dirty="0"/>
-              <a:t>25</a:t>
-            </a:r>
-          </a:p>
-        </p:txBody>
-      </p:sp>
     </p:spTree>
     <p:extLst>
       <p:ext uri="{BB962C8B-B14F-4D97-AF65-F5344CB8AC3E}">
-        <p14:creationId xmlns:p14="http://schemas.microsoft.com/office/powerpoint/2010/main" val="1667650881"/>
+        <p14:creationId xmlns:p14="http://schemas.microsoft.com/office/powerpoint/2010/main" val="446769231"/>
       </p:ext>
     </p:extLst>
   </p:cSld>
@@ -13884,470 +13388,6 @@
             <a:r>
               <a:rPr lang="pt-BR" dirty="0"/>
               <a:t>5. Jornada – Simplificada</a:t>
-            </a:r>
-          </a:p>
-        </p:txBody>
-      </p:sp>
-      <p:sp>
-        <p:nvSpPr>
-          <p:cNvPr id="7" name="Seta: Pentágono 6">
-            <a:extLst>
-              <a:ext uri="{FF2B5EF4-FFF2-40B4-BE49-F238E27FC236}">
-                <a16:creationId xmlns:a16="http://schemas.microsoft.com/office/drawing/2014/main" id="{FFD3DC5B-CCF8-4D95-A962-9E9AD67FABBC}"/>
-              </a:ext>
-            </a:extLst>
-          </p:cNvPr>
-          <p:cNvSpPr/>
-          <p:nvPr/>
-        </p:nvSpPr>
-        <p:spPr>
-          <a:xfrm>
-            <a:off x="2630901" y="1339514"/>
-            <a:ext cx="2518611" cy="625642"/>
-          </a:xfrm>
-          <a:prstGeom prst="homePlate">
-            <a:avLst/>
-          </a:prstGeom>
-          <a:solidFill>
-            <a:srgbClr val="32B9CD"/>
-          </a:solidFill>
-          <a:ln>
-            <a:noFill/>
-          </a:ln>
-        </p:spPr>
-        <p:style>
-          <a:lnRef idx="2">
-            <a:schemeClr val="accent1">
-              <a:shade val="50000"/>
-            </a:schemeClr>
-          </a:lnRef>
-          <a:fillRef idx="1">
-            <a:schemeClr val="accent1"/>
-          </a:fillRef>
-          <a:effectRef idx="0">
-            <a:schemeClr val="accent1"/>
-          </a:effectRef>
-          <a:fontRef idx="minor">
-            <a:schemeClr val="lt1"/>
-          </a:fontRef>
-        </p:style>
-        <p:txBody>
-          <a:bodyPr rtlCol="0" anchor="ctr"/>
-          <a:lstStyle/>
-          <a:p>
-            <a:pPr algn="ctr"/>
-            <a:r>
-              <a:rPr lang="pt-BR" dirty="0"/>
-              <a:t>FASES UTILIZADOR</a:t>
-            </a:r>
-          </a:p>
-        </p:txBody>
-      </p:sp>
-      <p:sp>
-        <p:nvSpPr>
-          <p:cNvPr id="8" name="Seta: Pentágono 7">
-            <a:extLst>
-              <a:ext uri="{FF2B5EF4-FFF2-40B4-BE49-F238E27FC236}">
-                <a16:creationId xmlns:a16="http://schemas.microsoft.com/office/drawing/2014/main" id="{1246D602-D2E6-4673-951D-352CAEA74EC5}"/>
-              </a:ext>
-            </a:extLst>
-          </p:cNvPr>
-          <p:cNvSpPr/>
-          <p:nvPr/>
-        </p:nvSpPr>
-        <p:spPr>
-          <a:xfrm>
-            <a:off x="5149512" y="1339514"/>
-            <a:ext cx="2518611" cy="625642"/>
-          </a:xfrm>
-          <a:prstGeom prst="homePlate">
-            <a:avLst/>
-          </a:prstGeom>
-          <a:solidFill>
-            <a:srgbClr val="32B9CD"/>
-          </a:solidFill>
-          <a:ln>
-            <a:noFill/>
-          </a:ln>
-        </p:spPr>
-        <p:style>
-          <a:lnRef idx="2">
-            <a:schemeClr val="accent1">
-              <a:shade val="50000"/>
-            </a:schemeClr>
-          </a:lnRef>
-          <a:fillRef idx="1">
-            <a:schemeClr val="accent1"/>
-          </a:fillRef>
-          <a:effectRef idx="0">
-            <a:schemeClr val="accent1"/>
-          </a:effectRef>
-          <a:fontRef idx="minor">
-            <a:schemeClr val="lt1"/>
-          </a:fontRef>
-        </p:style>
-        <p:txBody>
-          <a:bodyPr rtlCol="0" anchor="ctr"/>
-          <a:lstStyle/>
-          <a:p>
-            <a:pPr algn="ctr"/>
-            <a:r>
-              <a:rPr lang="pt-BR" dirty="0"/>
-              <a:t>FASES UTILIZADOR</a:t>
-            </a:r>
-          </a:p>
-        </p:txBody>
-      </p:sp>
-      <p:sp>
-        <p:nvSpPr>
-          <p:cNvPr id="9" name="Seta: Pentágono 8">
-            <a:extLst>
-              <a:ext uri="{FF2B5EF4-FFF2-40B4-BE49-F238E27FC236}">
-                <a16:creationId xmlns:a16="http://schemas.microsoft.com/office/drawing/2014/main" id="{A8CAF408-7AEF-46A5-BE2C-9BE73369B7E1}"/>
-              </a:ext>
-            </a:extLst>
-          </p:cNvPr>
-          <p:cNvSpPr/>
-          <p:nvPr/>
-        </p:nvSpPr>
-        <p:spPr>
-          <a:xfrm>
-            <a:off x="7712628" y="1339514"/>
-            <a:ext cx="2518611" cy="625642"/>
-          </a:xfrm>
-          <a:prstGeom prst="homePlate">
-            <a:avLst/>
-          </a:prstGeom>
-          <a:solidFill>
-            <a:srgbClr val="32B9CD"/>
-          </a:solidFill>
-          <a:ln>
-            <a:noFill/>
-          </a:ln>
-        </p:spPr>
-        <p:style>
-          <a:lnRef idx="2">
-            <a:schemeClr val="accent1">
-              <a:shade val="50000"/>
-            </a:schemeClr>
-          </a:lnRef>
-          <a:fillRef idx="1">
-            <a:schemeClr val="accent1"/>
-          </a:fillRef>
-          <a:effectRef idx="0">
-            <a:schemeClr val="accent1"/>
-          </a:effectRef>
-          <a:fontRef idx="minor">
-            <a:schemeClr val="lt1"/>
-          </a:fontRef>
-        </p:style>
-        <p:txBody>
-          <a:bodyPr rtlCol="0" anchor="ctr"/>
-          <a:lstStyle/>
-          <a:p>
-            <a:pPr algn="ctr"/>
-            <a:r>
-              <a:rPr lang="pt-BR" dirty="0"/>
-              <a:t>FASES UTILIZADOR</a:t>
-            </a:r>
-          </a:p>
-        </p:txBody>
-      </p:sp>
-      <p:sp>
-        <p:nvSpPr>
-          <p:cNvPr id="10" name="Seta: Pentágono 9">
-            <a:extLst>
-              <a:ext uri="{FF2B5EF4-FFF2-40B4-BE49-F238E27FC236}">
-                <a16:creationId xmlns:a16="http://schemas.microsoft.com/office/drawing/2014/main" id="{2E5D830F-E594-4A4E-865A-ED3EF8AED2C7}"/>
-              </a:ext>
-            </a:extLst>
-          </p:cNvPr>
-          <p:cNvSpPr/>
-          <p:nvPr/>
-        </p:nvSpPr>
-        <p:spPr>
-          <a:xfrm>
-            <a:off x="10319471" y="1339514"/>
-            <a:ext cx="2518611" cy="625642"/>
-          </a:xfrm>
-          <a:prstGeom prst="homePlate">
-            <a:avLst/>
-          </a:prstGeom>
-          <a:solidFill>
-            <a:srgbClr val="32B9CD"/>
-          </a:solidFill>
-          <a:ln>
-            <a:noFill/>
-          </a:ln>
-        </p:spPr>
-        <p:style>
-          <a:lnRef idx="2">
-            <a:schemeClr val="accent1">
-              <a:shade val="50000"/>
-            </a:schemeClr>
-          </a:lnRef>
-          <a:fillRef idx="1">
-            <a:schemeClr val="accent1"/>
-          </a:fillRef>
-          <a:effectRef idx="0">
-            <a:schemeClr val="accent1"/>
-          </a:effectRef>
-          <a:fontRef idx="minor">
-            <a:schemeClr val="lt1"/>
-          </a:fontRef>
-        </p:style>
-        <p:txBody>
-          <a:bodyPr rtlCol="0" anchor="ctr"/>
-          <a:lstStyle/>
-          <a:p>
-            <a:pPr algn="ctr"/>
-            <a:r>
-              <a:rPr lang="pt-BR" dirty="0"/>
-              <a:t>FASES UTILIZADOR</a:t>
-            </a:r>
-          </a:p>
-        </p:txBody>
-      </p:sp>
-      <p:cxnSp>
-        <p:nvCxnSpPr>
-          <p:cNvPr id="13" name="Conector reto 12">
-            <a:extLst>
-              <a:ext uri="{FF2B5EF4-FFF2-40B4-BE49-F238E27FC236}">
-                <a16:creationId xmlns:a16="http://schemas.microsoft.com/office/drawing/2014/main" id="{230C587B-167A-4046-8193-FE5D0F2BD5AD}"/>
-              </a:ext>
-            </a:extLst>
-          </p:cNvPr>
-          <p:cNvCxnSpPr/>
-          <p:nvPr/>
-        </p:nvCxnSpPr>
-        <p:spPr>
-          <a:xfrm>
-            <a:off x="248653" y="2106706"/>
-            <a:ext cx="12744000" cy="0"/>
-          </a:xfrm>
-          <a:prstGeom prst="line">
-            <a:avLst/>
-          </a:prstGeom>
-          <a:ln>
-            <a:solidFill>
-              <a:srgbClr val="32B9CD"/>
-            </a:solidFill>
-          </a:ln>
-        </p:spPr>
-        <p:style>
-          <a:lnRef idx="1">
-            <a:schemeClr val="accent1"/>
-          </a:lnRef>
-          <a:fillRef idx="0">
-            <a:schemeClr val="accent1"/>
-          </a:fillRef>
-          <a:effectRef idx="0">
-            <a:schemeClr val="accent1"/>
-          </a:effectRef>
-          <a:fontRef idx="minor">
-            <a:schemeClr val="tx1"/>
-          </a:fontRef>
-        </p:style>
-      </p:cxnSp>
-      <p:sp>
-        <p:nvSpPr>
-          <p:cNvPr id="14" name="Retângulo 13">
-            <a:extLst>
-              <a:ext uri="{FF2B5EF4-FFF2-40B4-BE49-F238E27FC236}">
-                <a16:creationId xmlns:a16="http://schemas.microsoft.com/office/drawing/2014/main" id="{C76ED18D-BAB8-4623-9F47-429CD0C89156}"/>
-              </a:ext>
-            </a:extLst>
-          </p:cNvPr>
-          <p:cNvSpPr/>
-          <p:nvPr/>
-        </p:nvSpPr>
-        <p:spPr>
-          <a:xfrm>
-            <a:off x="2630901" y="2163934"/>
-            <a:ext cx="2037351" cy="923330"/>
-          </a:xfrm>
-          <a:prstGeom prst="rect">
-            <a:avLst/>
-          </a:prstGeom>
-        </p:spPr>
-        <p:txBody>
-          <a:bodyPr wrap="square">
-            <a:spAutoFit/>
-          </a:bodyPr>
-          <a:lstStyle/>
-          <a:p>
-            <a:pPr marL="342900" indent="-342900">
-              <a:buFont typeface="Arial" panose="020B0604020202020204" pitchFamily="34" charset="0"/>
-              <a:buChar char="•"/>
-            </a:pPr>
-            <a:r>
-              <a:rPr lang="pt-BR" sz="1800" dirty="0">
-                <a:latin typeface="Exo 2" panose="00000500000000000000" pitchFamily="50" charset="0"/>
-              </a:rPr>
-              <a:t>Ação 1</a:t>
-            </a:r>
-          </a:p>
-          <a:p>
-            <a:pPr marL="342900" indent="-342900">
-              <a:buFont typeface="Arial" panose="020B0604020202020204" pitchFamily="34" charset="0"/>
-              <a:buChar char="•"/>
-            </a:pPr>
-            <a:r>
-              <a:rPr lang="pt-BR" sz="1800" dirty="0">
-                <a:latin typeface="Exo 2" panose="00000500000000000000" pitchFamily="50" charset="0"/>
-              </a:rPr>
-              <a:t>Ação 2</a:t>
-            </a:r>
-          </a:p>
-          <a:p>
-            <a:pPr marL="342900" indent="-342900">
-              <a:buFont typeface="Arial" panose="020B0604020202020204" pitchFamily="34" charset="0"/>
-              <a:buChar char="•"/>
-            </a:pPr>
-            <a:r>
-              <a:rPr lang="pt-BR" sz="1800" dirty="0">
-                <a:latin typeface="Exo 2" panose="00000500000000000000" pitchFamily="50" charset="0"/>
-              </a:rPr>
-              <a:t>Ação 3 </a:t>
-            </a:r>
-          </a:p>
-        </p:txBody>
-      </p:sp>
-      <p:cxnSp>
-        <p:nvCxnSpPr>
-          <p:cNvPr id="15" name="Conector reto 14">
-            <a:extLst>
-              <a:ext uri="{FF2B5EF4-FFF2-40B4-BE49-F238E27FC236}">
-                <a16:creationId xmlns:a16="http://schemas.microsoft.com/office/drawing/2014/main" id="{E8282CFB-9587-4BFA-A168-54B336E1D1FD}"/>
-              </a:ext>
-            </a:extLst>
-          </p:cNvPr>
-          <p:cNvCxnSpPr/>
-          <p:nvPr/>
-        </p:nvCxnSpPr>
-        <p:spPr>
-          <a:xfrm>
-            <a:off x="248653" y="3205592"/>
-            <a:ext cx="12744000" cy="0"/>
-          </a:xfrm>
-          <a:prstGeom prst="line">
-            <a:avLst/>
-          </a:prstGeom>
-          <a:ln>
-            <a:solidFill>
-              <a:srgbClr val="32B9CD"/>
-            </a:solidFill>
-          </a:ln>
-        </p:spPr>
-        <p:style>
-          <a:lnRef idx="1">
-            <a:schemeClr val="accent1"/>
-          </a:lnRef>
-          <a:fillRef idx="0">
-            <a:schemeClr val="accent1"/>
-          </a:fillRef>
-          <a:effectRef idx="0">
-            <a:schemeClr val="accent1"/>
-          </a:effectRef>
-          <a:fontRef idx="minor">
-            <a:schemeClr val="tx1"/>
-          </a:fontRef>
-        </p:style>
-      </p:cxnSp>
-      <p:sp>
-        <p:nvSpPr>
-          <p:cNvPr id="17" name="Retângulo 16">
-            <a:extLst>
-              <a:ext uri="{FF2B5EF4-FFF2-40B4-BE49-F238E27FC236}">
-                <a16:creationId xmlns:a16="http://schemas.microsoft.com/office/drawing/2014/main" id="{E924F593-86B6-43D8-BBC2-C83416E7E647}"/>
-              </a:ext>
-            </a:extLst>
-          </p:cNvPr>
-          <p:cNvSpPr/>
-          <p:nvPr/>
-        </p:nvSpPr>
-        <p:spPr>
-          <a:xfrm>
-            <a:off x="248653" y="1283364"/>
-            <a:ext cx="2184972" cy="769441"/>
-          </a:xfrm>
-          <a:prstGeom prst="rect">
-            <a:avLst/>
-          </a:prstGeom>
-        </p:spPr>
-        <p:txBody>
-          <a:bodyPr wrap="square">
-            <a:spAutoFit/>
-          </a:bodyPr>
-          <a:lstStyle/>
-          <a:p>
-            <a:r>
-              <a:rPr lang="pt-BR" sz="2800" b="1" dirty="0">
-                <a:solidFill>
-                  <a:srgbClr val="E6005A"/>
-                </a:solidFill>
-                <a:latin typeface="Exo 2" panose="00000500000000000000" pitchFamily="50" charset="0"/>
-              </a:rPr>
-              <a:t>Fases </a:t>
-            </a:r>
-            <a:r>
-              <a:rPr lang="pt-BR" sz="1600" b="1" dirty="0">
-                <a:solidFill>
-                  <a:srgbClr val="E6005A"/>
-                </a:solidFill>
-                <a:latin typeface="Exo 2" panose="00000500000000000000" pitchFamily="50" charset="0"/>
-              </a:rPr>
-              <a:t>(utilizador)</a:t>
-            </a:r>
-          </a:p>
-        </p:txBody>
-      </p:sp>
-      <p:sp>
-        <p:nvSpPr>
-          <p:cNvPr id="18" name="Retângulo 17">
-            <a:extLst>
-              <a:ext uri="{FF2B5EF4-FFF2-40B4-BE49-F238E27FC236}">
-                <a16:creationId xmlns:a16="http://schemas.microsoft.com/office/drawing/2014/main" id="{56D4EF9F-24DA-4535-8158-6E054700D6C9}"/>
-              </a:ext>
-            </a:extLst>
-          </p:cNvPr>
-          <p:cNvSpPr/>
-          <p:nvPr/>
-        </p:nvSpPr>
-        <p:spPr>
-          <a:xfrm>
-            <a:off x="248653" y="2163934"/>
-            <a:ext cx="2184972" cy="800219"/>
-          </a:xfrm>
-          <a:prstGeom prst="rect">
-            <a:avLst/>
-          </a:prstGeom>
-        </p:spPr>
-        <p:txBody>
-          <a:bodyPr wrap="square">
-            <a:spAutoFit/>
-          </a:bodyPr>
-          <a:lstStyle/>
-          <a:p>
-            <a:r>
-              <a:rPr lang="pt-BR" sz="2800" b="1" dirty="0">
-                <a:solidFill>
-                  <a:srgbClr val="E6005A"/>
-                </a:solidFill>
-                <a:latin typeface="Exo 2" panose="00000500000000000000" pitchFamily="50" charset="0"/>
-              </a:rPr>
-              <a:t>Faz</a:t>
-            </a:r>
-          </a:p>
-          <a:p>
-            <a:r>
-              <a:rPr lang="pt-BR" sz="1800" b="1" dirty="0">
-                <a:solidFill>
-                  <a:srgbClr val="E6005A"/>
-                </a:solidFill>
-                <a:latin typeface="Exo 2" panose="00000500000000000000" pitchFamily="50" charset="0"/>
-              </a:rPr>
-              <a:t>(ações do usuário) </a:t>
             </a:r>
           </a:p>
         </p:txBody>
@@ -14510,45 +13550,6 @@
       </p:pic>
       <p:pic>
         <p:nvPicPr>
-          <p:cNvPr id="28" name="Gráfico 27" descr="Rosto surpreso sem preenchimento ">
-            <a:extLst>
-              <a:ext uri="{FF2B5EF4-FFF2-40B4-BE49-F238E27FC236}">
-                <a16:creationId xmlns:a16="http://schemas.microsoft.com/office/drawing/2014/main" id="{41BFD2CF-18FC-4ABB-8BE0-194A2318470A}"/>
-              </a:ext>
-            </a:extLst>
-          </p:cNvPr>
-          <p:cNvPicPr>
-            <a:picLocks noChangeAspect="1"/>
-          </p:cNvPicPr>
-          <p:nvPr/>
-        </p:nvPicPr>
-        <p:blipFill>
-          <a:blip r:embed="rId10">
-            <a:extLst>
-              <a:ext uri="{28A0092B-C50C-407E-A947-70E740481C1C}">
-                <a14:useLocalDpi xmlns:a14="http://schemas.microsoft.com/office/drawing/2010/main"/>
-              </a:ext>
-              <a:ext uri="{96DAC541-7B7A-43D3-8B79-37D633B846F1}">
-                <asvg:svgBlip xmlns:asvg="http://schemas.microsoft.com/office/drawing/2016/SVG/main" r:embed="rId11"/>
-              </a:ext>
-            </a:extLst>
-          </a:blip>
-          <a:stretch>
-            <a:fillRect/>
-          </a:stretch>
-        </p:blipFill>
-        <p:spPr>
-          <a:xfrm>
-            <a:off x="2975806" y="3217006"/>
-            <a:ext cx="914400" cy="914400"/>
-          </a:xfrm>
-          <a:prstGeom prst="rect">
-            <a:avLst/>
-          </a:prstGeom>
-        </p:spPr>
-      </p:pic>
-      <p:pic>
-        <p:nvPicPr>
           <p:cNvPr id="29" name="Gráfico 28" descr="Rosto sorridente sem preenchimento ">
             <a:extLst>
               <a:ext uri="{FF2B5EF4-FFF2-40B4-BE49-F238E27FC236}">
@@ -14586,252 +13587,6 @@
           </a:prstGeom>
         </p:spPr>
       </p:pic>
-      <p:sp>
-        <p:nvSpPr>
-          <p:cNvPr id="30" name="Retângulo 29">
-            <a:extLst>
-              <a:ext uri="{FF2B5EF4-FFF2-40B4-BE49-F238E27FC236}">
-                <a16:creationId xmlns:a16="http://schemas.microsoft.com/office/drawing/2014/main" id="{A54099A1-86BA-49DD-921E-A12E1EA75F22}"/>
-              </a:ext>
-            </a:extLst>
-          </p:cNvPr>
-          <p:cNvSpPr/>
-          <p:nvPr/>
-        </p:nvSpPr>
-        <p:spPr>
-          <a:xfrm>
-            <a:off x="248653" y="3295700"/>
-            <a:ext cx="2382248" cy="830997"/>
-          </a:xfrm>
-          <a:prstGeom prst="rect">
-            <a:avLst/>
-          </a:prstGeom>
-        </p:spPr>
-        <p:txBody>
-          <a:bodyPr wrap="square">
-            <a:spAutoFit/>
-          </a:bodyPr>
-          <a:lstStyle/>
-          <a:p>
-            <a:r>
-              <a:rPr lang="pt-BR" sz="2800" b="1" dirty="0">
-                <a:solidFill>
-                  <a:srgbClr val="E6005A"/>
-                </a:solidFill>
-                <a:latin typeface="Exo 2" panose="00000500000000000000" pitchFamily="50" charset="0"/>
-              </a:rPr>
-              <a:t>Sente</a:t>
-            </a:r>
-          </a:p>
-          <a:p>
-            <a:r>
-              <a:rPr lang="pt-BR" sz="2000" b="1" dirty="0">
-                <a:solidFill>
-                  <a:srgbClr val="E6005A"/>
-                </a:solidFill>
-                <a:latin typeface="Exo 2" panose="00000500000000000000" pitchFamily="50" charset="0"/>
-              </a:rPr>
-              <a:t>(dores do usuário) </a:t>
-            </a:r>
-          </a:p>
-        </p:txBody>
-      </p:sp>
-      <p:cxnSp>
-        <p:nvCxnSpPr>
-          <p:cNvPr id="31" name="Conector reto 30">
-            <a:extLst>
-              <a:ext uri="{FF2B5EF4-FFF2-40B4-BE49-F238E27FC236}">
-                <a16:creationId xmlns:a16="http://schemas.microsoft.com/office/drawing/2014/main" id="{CC0D5044-B87E-4741-83CC-572EC6DF96A2}"/>
-              </a:ext>
-            </a:extLst>
-          </p:cNvPr>
-          <p:cNvCxnSpPr/>
-          <p:nvPr/>
-        </p:nvCxnSpPr>
-        <p:spPr>
-          <a:xfrm>
-            <a:off x="248653" y="4320521"/>
-            <a:ext cx="12744000" cy="0"/>
-          </a:xfrm>
-          <a:prstGeom prst="line">
-            <a:avLst/>
-          </a:prstGeom>
-          <a:ln>
-            <a:solidFill>
-              <a:srgbClr val="32B9CD"/>
-            </a:solidFill>
-          </a:ln>
-        </p:spPr>
-        <p:style>
-          <a:lnRef idx="1">
-            <a:schemeClr val="accent1"/>
-          </a:lnRef>
-          <a:fillRef idx="0">
-            <a:schemeClr val="accent1"/>
-          </a:fillRef>
-          <a:effectRef idx="0">
-            <a:schemeClr val="accent1"/>
-          </a:effectRef>
-          <a:fontRef idx="minor">
-            <a:schemeClr val="tx1"/>
-          </a:fontRef>
-        </p:style>
-      </p:cxnSp>
-      <p:sp>
-        <p:nvSpPr>
-          <p:cNvPr id="32" name="Retângulo 31">
-            <a:extLst>
-              <a:ext uri="{FF2B5EF4-FFF2-40B4-BE49-F238E27FC236}">
-                <a16:creationId xmlns:a16="http://schemas.microsoft.com/office/drawing/2014/main" id="{057FCB7D-5B0A-4D23-AEF9-7F2AA1E30C76}"/>
-              </a:ext>
-            </a:extLst>
-          </p:cNvPr>
-          <p:cNvSpPr/>
-          <p:nvPr/>
-        </p:nvSpPr>
-        <p:spPr>
-          <a:xfrm>
-            <a:off x="2719133" y="4610356"/>
-            <a:ext cx="2037351" cy="923330"/>
-          </a:xfrm>
-          <a:prstGeom prst="rect">
-            <a:avLst/>
-          </a:prstGeom>
-        </p:spPr>
-        <p:txBody>
-          <a:bodyPr wrap="square">
-            <a:spAutoFit/>
-          </a:bodyPr>
-          <a:lstStyle/>
-          <a:p>
-            <a:pPr marL="342900" indent="-342900">
-              <a:buFont typeface="Arial" panose="020B0604020202020204" pitchFamily="34" charset="0"/>
-              <a:buChar char="•"/>
-            </a:pPr>
-            <a:r>
-              <a:rPr lang="pt-BR" sz="1800" dirty="0">
-                <a:latin typeface="Exo 2" panose="00000500000000000000" pitchFamily="50" charset="0"/>
-              </a:rPr>
-              <a:t>Pensamento 1</a:t>
-            </a:r>
-          </a:p>
-          <a:p>
-            <a:pPr marL="342900" indent="-342900">
-              <a:buFont typeface="Arial" panose="020B0604020202020204" pitchFamily="34" charset="0"/>
-              <a:buChar char="•"/>
-            </a:pPr>
-            <a:r>
-              <a:rPr lang="pt-BR" sz="1800" dirty="0">
-                <a:latin typeface="Exo 2" panose="00000500000000000000" pitchFamily="50" charset="0"/>
-              </a:rPr>
-              <a:t>Pensamento 2</a:t>
-            </a:r>
-          </a:p>
-          <a:p>
-            <a:pPr marL="342900" indent="-342900">
-              <a:buFont typeface="Arial" panose="020B0604020202020204" pitchFamily="34" charset="0"/>
-              <a:buChar char="•"/>
-            </a:pPr>
-            <a:r>
-              <a:rPr lang="pt-BR" sz="1800" dirty="0">
-                <a:latin typeface="Exo 2" panose="00000500000000000000" pitchFamily="50" charset="0"/>
-              </a:rPr>
-              <a:t>Pensamento 3</a:t>
-            </a:r>
-          </a:p>
-        </p:txBody>
-      </p:sp>
-      <p:cxnSp>
-        <p:nvCxnSpPr>
-          <p:cNvPr id="33" name="Conector reto 32">
-            <a:extLst>
-              <a:ext uri="{FF2B5EF4-FFF2-40B4-BE49-F238E27FC236}">
-                <a16:creationId xmlns:a16="http://schemas.microsoft.com/office/drawing/2014/main" id="{9D1FDD8A-6877-49FB-A4A9-32172D6FE06F}"/>
-              </a:ext>
-            </a:extLst>
-          </p:cNvPr>
-          <p:cNvCxnSpPr/>
-          <p:nvPr/>
-        </p:nvCxnSpPr>
-        <p:spPr>
-          <a:xfrm>
-            <a:off x="248653" y="5796400"/>
-            <a:ext cx="12744000" cy="0"/>
-          </a:xfrm>
-          <a:prstGeom prst="line">
-            <a:avLst/>
-          </a:prstGeom>
-          <a:ln>
-            <a:solidFill>
-              <a:srgbClr val="32B9CD"/>
-            </a:solidFill>
-          </a:ln>
-        </p:spPr>
-        <p:style>
-          <a:lnRef idx="1">
-            <a:schemeClr val="accent1"/>
-          </a:lnRef>
-          <a:fillRef idx="0">
-            <a:schemeClr val="accent1"/>
-          </a:fillRef>
-          <a:effectRef idx="0">
-            <a:schemeClr val="accent1"/>
-          </a:effectRef>
-          <a:fontRef idx="minor">
-            <a:schemeClr val="tx1"/>
-          </a:fontRef>
-        </p:style>
-      </p:cxnSp>
-      <p:sp>
-        <p:nvSpPr>
-          <p:cNvPr id="34" name="Retângulo 33">
-            <a:extLst>
-              <a:ext uri="{FF2B5EF4-FFF2-40B4-BE49-F238E27FC236}">
-                <a16:creationId xmlns:a16="http://schemas.microsoft.com/office/drawing/2014/main" id="{65DFBC55-8446-4393-8E00-5D2F0A377509}"/>
-              </a:ext>
-            </a:extLst>
-          </p:cNvPr>
-          <p:cNvSpPr/>
-          <p:nvPr/>
-        </p:nvSpPr>
-        <p:spPr>
-          <a:xfrm>
-            <a:off x="248653" y="4610356"/>
-            <a:ext cx="2184972" cy="830997"/>
-          </a:xfrm>
-          <a:prstGeom prst="rect">
-            <a:avLst/>
-          </a:prstGeom>
-        </p:spPr>
-        <p:txBody>
-          <a:bodyPr wrap="square">
-            <a:spAutoFit/>
-          </a:bodyPr>
-          <a:lstStyle/>
-          <a:p>
-            <a:r>
-              <a:rPr lang="pt-BR" sz="2800" b="1" dirty="0">
-                <a:solidFill>
-                  <a:srgbClr val="E6005A"/>
-                </a:solidFill>
-                <a:latin typeface="Exo 2" panose="00000500000000000000" pitchFamily="50" charset="0"/>
-              </a:rPr>
-              <a:t>Pensa</a:t>
-            </a:r>
-          </a:p>
-          <a:p>
-            <a:r>
-              <a:rPr lang="pt-BR" sz="2000" b="1" dirty="0">
-                <a:solidFill>
-                  <a:srgbClr val="E6005A"/>
-                </a:solidFill>
-                <a:latin typeface="Exo 2" panose="00000500000000000000" pitchFamily="50" charset="0"/>
-              </a:rPr>
-              <a:t>(usuário) </a:t>
-            </a:r>
-          </a:p>
-        </p:txBody>
-      </p:sp>
       <p:pic>
         <p:nvPicPr>
           <p:cNvPr id="39" name="Gráfico 38" descr="Envelope">
@@ -14847,13 +13602,13 @@
           <p:nvPr/>
         </p:nvPicPr>
         <p:blipFill>
-          <a:blip r:embed="rId12">
+          <a:blip r:embed="rId10">
             <a:extLst>
               <a:ext uri="{28A0092B-C50C-407E-A947-70E740481C1C}">
                 <a14:useLocalDpi xmlns:a14="http://schemas.microsoft.com/office/drawing/2010/main"/>
               </a:ext>
               <a:ext uri="{96DAC541-7B7A-43D3-8B79-37D633B846F1}">
-                <asvg:svgBlip xmlns:asvg="http://schemas.microsoft.com/office/drawing/2016/SVG/main" r:embed="rId13"/>
+                <asvg:svgBlip xmlns:asvg="http://schemas.microsoft.com/office/drawing/2016/SVG/main" r:embed="rId11"/>
               </a:ext>
             </a:extLst>
           </a:blip>
@@ -14886,13 +13641,13 @@
           <p:nvPr/>
         </p:nvPicPr>
         <p:blipFill>
-          <a:blip r:embed="rId14">
+          <a:blip r:embed="rId12">
             <a:extLst>
               <a:ext uri="{28A0092B-C50C-407E-A947-70E740481C1C}">
                 <a14:useLocalDpi xmlns:a14="http://schemas.microsoft.com/office/drawing/2010/main"/>
               </a:ext>
               <a:ext uri="{96DAC541-7B7A-43D3-8B79-37D633B846F1}">
-                <asvg:svgBlip xmlns:asvg="http://schemas.microsoft.com/office/drawing/2016/SVG/main" r:embed="rId15"/>
+                <asvg:svgBlip xmlns:asvg="http://schemas.microsoft.com/office/drawing/2016/SVG/main" r:embed="rId13"/>
               </a:ext>
             </a:extLst>
           </a:blip>
@@ -14925,13 +13680,13 @@
           <p:nvPr/>
         </p:nvPicPr>
         <p:blipFill>
-          <a:blip r:embed="rId16">
+          <a:blip r:embed="rId14">
             <a:extLst>
               <a:ext uri="{28A0092B-C50C-407E-A947-70E740481C1C}">
                 <a14:useLocalDpi xmlns:a14="http://schemas.microsoft.com/office/drawing/2010/main"/>
               </a:ext>
               <a:ext uri="{96DAC541-7B7A-43D3-8B79-37D633B846F1}">
-                <asvg:svgBlip xmlns:asvg="http://schemas.microsoft.com/office/drawing/2016/SVG/main" r:embed="rId17"/>
+                <asvg:svgBlip xmlns:asvg="http://schemas.microsoft.com/office/drawing/2016/SVG/main" r:embed="rId15"/>
               </a:ext>
             </a:extLst>
           </a:blip>
@@ -14964,13 +13719,13 @@
           <p:nvPr/>
         </p:nvPicPr>
         <p:blipFill>
-          <a:blip r:embed="rId18">
+          <a:blip r:embed="rId16">
             <a:extLst>
               <a:ext uri="{28A0092B-C50C-407E-A947-70E740481C1C}">
                 <a14:useLocalDpi xmlns:a14="http://schemas.microsoft.com/office/drawing/2010/main"/>
               </a:ext>
               <a:ext uri="{96DAC541-7B7A-43D3-8B79-37D633B846F1}">
-                <asvg:svgBlip xmlns:asvg="http://schemas.microsoft.com/office/drawing/2016/SVG/main" r:embed="rId19"/>
+                <asvg:svgBlip xmlns:asvg="http://schemas.microsoft.com/office/drawing/2016/SVG/main" r:embed="rId17"/>
               </a:ext>
             </a:extLst>
           </a:blip>
@@ -14988,108 +13743,42 @@
           </a:prstGeom>
         </p:spPr>
       </p:pic>
-      <p:sp>
-        <p:nvSpPr>
-          <p:cNvPr id="50" name="Retângulo 49">
+      <p:pic>
+        <p:nvPicPr>
+          <p:cNvPr id="5" name="Imagem 4" descr="Tabela&#10;&#10;Descrição gerada automaticamente">
             <a:extLst>
               <a:ext uri="{FF2B5EF4-FFF2-40B4-BE49-F238E27FC236}">
-                <a16:creationId xmlns:a16="http://schemas.microsoft.com/office/drawing/2014/main" id="{9A498E02-A53D-43C5-8A8C-E911C378ACFE}"/>
+                <a16:creationId xmlns:a16="http://schemas.microsoft.com/office/drawing/2014/main" id="{4F6935CD-C0D9-442B-A5C2-96BECF799C61}"/>
               </a:ext>
             </a:extLst>
           </p:cNvPr>
-          <p:cNvSpPr/>
+          <p:cNvPicPr>
+            <a:picLocks noChangeAspect="1"/>
+          </p:cNvPicPr>
           <p:nvPr/>
-        </p:nvSpPr>
+        </p:nvPicPr>
+        <p:blipFill>
+          <a:blip r:embed="rId18">
+            <a:extLst>
+              <a:ext uri="{28A0092B-C50C-407E-A947-70E740481C1C}">
+                <a14:useLocalDpi xmlns:a14="http://schemas.microsoft.com/office/drawing/2010/main" val="0"/>
+              </a:ext>
+            </a:extLst>
+          </a:blip>
+          <a:stretch>
+            <a:fillRect/>
+          </a:stretch>
+        </p:blipFill>
         <p:spPr>
           <a:xfrm>
-            <a:off x="256675" y="5987678"/>
-            <a:ext cx="2184972" cy="800219"/>
+            <a:off x="104413" y="1809386"/>
+            <a:ext cx="13234124" cy="3942489"/>
           </a:xfrm>
           <a:prstGeom prst="rect">
             <a:avLst/>
           </a:prstGeom>
         </p:spPr>
-        <p:txBody>
-          <a:bodyPr wrap="square">
-            <a:spAutoFit/>
-          </a:bodyPr>
-          <a:lstStyle/>
-          <a:p>
-            <a:r>
-              <a:rPr lang="pt-BR" sz="2800" b="1" dirty="0">
-                <a:solidFill>
-                  <a:srgbClr val="E6005A"/>
-                </a:solidFill>
-                <a:latin typeface="Exo 2" panose="00000500000000000000" pitchFamily="50" charset="0"/>
-              </a:rPr>
-              <a:t>Proposta</a:t>
-            </a:r>
-          </a:p>
-          <a:p>
-            <a:r>
-              <a:rPr lang="pt-BR" sz="1800" b="1" dirty="0">
-                <a:solidFill>
-                  <a:srgbClr val="E6005A"/>
-                </a:solidFill>
-                <a:latin typeface="Exo 2" panose="00000500000000000000" pitchFamily="50" charset="0"/>
-              </a:rPr>
-              <a:t>(mudanças) </a:t>
-            </a:r>
-          </a:p>
-        </p:txBody>
-      </p:sp>
-      <p:sp>
-        <p:nvSpPr>
-          <p:cNvPr id="51" name="Retângulo 50">
-            <a:extLst>
-              <a:ext uri="{FF2B5EF4-FFF2-40B4-BE49-F238E27FC236}">
-                <a16:creationId xmlns:a16="http://schemas.microsoft.com/office/drawing/2014/main" id="{C8A70B33-92D8-4986-AA19-E48CE787D15D}"/>
-              </a:ext>
-            </a:extLst>
-          </p:cNvPr>
-          <p:cNvSpPr/>
-          <p:nvPr/>
-        </p:nvSpPr>
-        <p:spPr>
-          <a:xfrm>
-            <a:off x="2719132" y="6001167"/>
-            <a:ext cx="2037351" cy="646331"/>
-          </a:xfrm>
-          <a:prstGeom prst="rect">
-            <a:avLst/>
-          </a:prstGeom>
-        </p:spPr>
-        <p:txBody>
-          <a:bodyPr wrap="square">
-            <a:spAutoFit/>
-          </a:bodyPr>
-          <a:lstStyle/>
-          <a:p>
-            <a:pPr marL="342900" indent="-342900">
-              <a:buFont typeface="Arial" panose="020B0604020202020204" pitchFamily="34" charset="0"/>
-              <a:buChar char="•"/>
-            </a:pPr>
-            <a:r>
-              <a:rPr lang="pt-BR" sz="1800" dirty="0">
-                <a:latin typeface="Exo 2" panose="00000500000000000000" pitchFamily="50" charset="0"/>
-              </a:rPr>
-              <a:t>Fazer isso</a:t>
-            </a:r>
-          </a:p>
-          <a:p>
-            <a:pPr marL="342900" indent="-342900">
-              <a:buFont typeface="Arial" panose="020B0604020202020204" pitchFamily="34" charset="0"/>
-              <a:buChar char="•"/>
-            </a:pPr>
-            <a:r>
-              <a:rPr lang="pt-BR" sz="1800" dirty="0">
-                <a:latin typeface="Exo 2" panose="00000500000000000000" pitchFamily="50" charset="0"/>
-              </a:rPr>
-              <a:t>Fazer aquilo</a:t>
-            </a:r>
-          </a:p>
-        </p:txBody>
-      </p:sp>
+      </p:pic>
     </p:spTree>
     <p:extLst>
       <p:ext uri="{BB962C8B-B14F-4D97-AF65-F5344CB8AC3E}">
@@ -21065,12 +19754,6 @@
 </file>
 
 <file path=customXml/item1.xml><?xml version="1.0" encoding="utf-8"?>
-<p:properties xmlns:p="http://schemas.microsoft.com/office/2006/metadata/properties" xmlns:xsi="http://www.w3.org/2001/XMLSchema-instance" xmlns:pc="http://schemas.microsoft.com/office/infopath/2007/PartnerControls">
-  <documentManagement/>
-</p:properties>
-</file>
-
-<file path=customXml/item2.xml><?xml version="1.0" encoding="utf-8"?>
 <ct:contentTypeSchema xmlns:ct="http://schemas.microsoft.com/office/2006/metadata/contentType" xmlns:ma="http://schemas.microsoft.com/office/2006/metadata/properties/metaAttributes" ct:_="" ma:_="" ma:contentTypeName="Document" ma:contentTypeID="0x0101001132905C37EA9847A7207C4BBCCCD8F4" ma:contentTypeVersion="13" ma:contentTypeDescription="Create a new document." ma:contentTypeScope="" ma:versionID="0fa59793b99d27e1e0b856ab72ac2f0d">
   <xsd:schema xmlns:xsd="http://www.w3.org/2001/XMLSchema" xmlns:xs="http://www.w3.org/2001/XMLSchema" xmlns:p="http://schemas.microsoft.com/office/2006/metadata/properties" xmlns:ns3="4327b14a-fe89-488e-9f6d-9658cacf372b" xmlns:ns4="bbcd8c33-6940-4d4c-a587-bbc736ca1e4d" targetNamespace="http://schemas.microsoft.com/office/2006/metadata/properties" ma:root="true" ma:fieldsID="01494effa1b4414faf4d9851fe547c93" ns3:_="" ns4:_="">
     <xsd:import namespace="4327b14a-fe89-488e-9f6d-9658cacf372b"/>
@@ -21293,6 +19976,12 @@
 </ct:contentTypeSchema>
 </file>
 
+<file path=customXml/item2.xml><?xml version="1.0" encoding="utf-8"?>
+<p:properties xmlns:p="http://schemas.microsoft.com/office/2006/metadata/properties" xmlns:xsi="http://www.w3.org/2001/XMLSchema-instance" xmlns:pc="http://schemas.microsoft.com/office/infopath/2007/PartnerControls">
+  <documentManagement/>
+</p:properties>
+</file>
+
 <file path=customXml/item3.xml><?xml version="1.0" encoding="utf-8"?>
 <?mso-contentType ?>
 <FormTemplates xmlns="http://schemas.microsoft.com/sharepoint/v3/contenttype/forms">
@@ -21303,23 +19992,6 @@
 </file>
 
 <file path=customXml/itemProps1.xml><?xml version="1.0" encoding="utf-8"?>
-<ds:datastoreItem xmlns:ds="http://schemas.openxmlformats.org/officeDocument/2006/customXml" ds:itemID="{08323129-B204-40D5-AFF8-9C9A9BF3922E}">
-  <ds:schemaRefs>
-    <ds:schemaRef ds:uri="http://purl.org/dc/terms/"/>
-    <ds:schemaRef ds:uri="http://purl.org/dc/dcmitype/"/>
-    <ds:schemaRef ds:uri="http://schemas.microsoft.com/office/infopath/2007/PartnerControls"/>
-    <ds:schemaRef ds:uri="http://schemas.openxmlformats.org/package/2006/metadata/core-properties"/>
-    <ds:schemaRef ds:uri="http://purl.org/dc/elements/1.1/"/>
-    <ds:schemaRef ds:uri="bbcd8c33-6940-4d4c-a587-bbc736ca1e4d"/>
-    <ds:schemaRef ds:uri="http://schemas.microsoft.com/office/2006/documentManagement/types"/>
-    <ds:schemaRef ds:uri="4327b14a-fe89-488e-9f6d-9658cacf372b"/>
-    <ds:schemaRef ds:uri="http://schemas.microsoft.com/office/2006/metadata/properties"/>
-    <ds:schemaRef ds:uri="http://www.w3.org/XML/1998/namespace"/>
-  </ds:schemaRefs>
-</ds:datastoreItem>
-</file>
-
-<file path=customXml/itemProps2.xml><?xml version="1.0" encoding="utf-8"?>
 <ds:datastoreItem xmlns:ds="http://schemas.openxmlformats.org/officeDocument/2006/customXml" ds:itemID="{6DE4A8B5-68AC-4B03-B2A1-E04BE1806673}">
   <ds:schemaRefs>
     <ds:schemaRef ds:uri="http://schemas.microsoft.com/office/2006/metadata/contentType"/>
@@ -21338,6 +20010,23 @@
 </ds:datastoreItem>
 </file>
 
+<file path=customXml/itemProps2.xml><?xml version="1.0" encoding="utf-8"?>
+<ds:datastoreItem xmlns:ds="http://schemas.openxmlformats.org/officeDocument/2006/customXml" ds:itemID="{08323129-B204-40D5-AFF8-9C9A9BF3922E}">
+  <ds:schemaRefs>
+    <ds:schemaRef ds:uri="http://purl.org/dc/terms/"/>
+    <ds:schemaRef ds:uri="http://purl.org/dc/dcmitype/"/>
+    <ds:schemaRef ds:uri="http://schemas.microsoft.com/office/infopath/2007/PartnerControls"/>
+    <ds:schemaRef ds:uri="http://schemas.openxmlformats.org/package/2006/metadata/core-properties"/>
+    <ds:schemaRef ds:uri="http://purl.org/dc/elements/1.1/"/>
+    <ds:schemaRef ds:uri="bbcd8c33-6940-4d4c-a587-bbc736ca1e4d"/>
+    <ds:schemaRef ds:uri="http://schemas.microsoft.com/office/2006/documentManagement/types"/>
+    <ds:schemaRef ds:uri="4327b14a-fe89-488e-9f6d-9658cacf372b"/>
+    <ds:schemaRef ds:uri="http://schemas.microsoft.com/office/2006/metadata/properties"/>
+    <ds:schemaRef ds:uri="http://www.w3.org/XML/1998/namespace"/>
+  </ds:schemaRefs>
+</ds:datastoreItem>
+</file>
+
 <file path=customXml/itemProps3.xml><?xml version="1.0" encoding="utf-8"?>
 <ds:datastoreItem xmlns:ds="http://schemas.openxmlformats.org/officeDocument/2006/customXml" ds:itemID="{C5C26249-539D-4496-936B-3CD83A43905E}">
   <ds:schemaRefs>

</xml_diff>

<commit_message>
feature: adicionar nova jornada de usuario
</commit_message>
<xml_diff>
--- a/Documentação/EngenhariaDeSoftware/Sprint1-Engenharia-de-Software.pptx
+++ b/Documentação/EngenhariaDeSoftware/Sprint1-Engenharia-de-Software.pptx
@@ -6,10 +6,10 @@
     <p:sldMasterId id="2147483665" r:id="rId5"/>
   </p:sldMasterIdLst>
   <p:notesMasterIdLst>
-    <p:notesMasterId r:id="rId23"/>
+    <p:notesMasterId r:id="rId24"/>
   </p:notesMasterIdLst>
   <p:handoutMasterIdLst>
-    <p:handoutMasterId r:id="rId24"/>
+    <p:handoutMasterId r:id="rId25"/>
   </p:handoutMasterIdLst>
   <p:sldIdLst>
     <p:sldId id="607" r:id="rId6"/>
@@ -28,7 +28,8 @@
     <p:sldId id="636" r:id="rId19"/>
     <p:sldId id="605" r:id="rId20"/>
     <p:sldId id="600" r:id="rId21"/>
-    <p:sldId id="627" r:id="rId22"/>
+    <p:sldId id="637" r:id="rId22"/>
+    <p:sldId id="627" r:id="rId23"/>
   </p:sldIdLst>
   <p:sldSz cx="13442950" cy="7561263"/>
   <p:notesSz cx="6858000" cy="9144000"/>
@@ -2278,7 +2279,7 @@
             <a:fld id="{C3CD65D1-5C11-455D-9F9A-0E035F00A0DA}" type="datetimeFigureOut">
               <a:rPr lang="pt-BR" smtClean="0"/>
               <a:pPr/>
-              <a:t>31/08/2021</a:t>
+              <a:t>07/09/2021</a:t>
             </a:fld>
             <a:endParaRPr lang="pt-BR"/>
           </a:p>
@@ -2446,7 +2447,7 @@
             <a:fld id="{A05DA3EF-18EA-43DE-B1BB-402A3C558822}" type="datetimeFigureOut">
               <a:rPr lang="pt-BR" smtClean="0"/>
               <a:pPr/>
-              <a:t>31/08/2021</a:t>
+              <a:t>07/09/2021</a:t>
             </a:fld>
             <a:endParaRPr lang="pt-BR"/>
           </a:p>
@@ -12834,7 +12835,7 @@
             <a:pPr algn="ctr"/>
             <a:r>
               <a:rPr lang="pt-BR" dirty="0"/>
-              <a:t>QUE COISA ISSO! DE COLOCAR A FOTO</a:t>
+              <a:t>Queria ser avisado sobre a data de entrega</a:t>
             </a:r>
           </a:p>
         </p:txBody>
@@ -12853,7 +12854,7 @@
         </p:nvSpPr>
         <p:spPr>
           <a:xfrm>
-            <a:off x="6721475" y="1526853"/>
+            <a:off x="9199204" y="1388138"/>
             <a:ext cx="2316480" cy="1325880"/>
           </a:xfrm>
           <a:prstGeom prst="cloudCallout">
@@ -12883,7 +12884,7 @@
             <a:pPr algn="ctr"/>
             <a:r>
               <a:rPr lang="pt-BR" dirty="0"/>
-              <a:t>PARA QUE ISSO?</a:t>
+              <a:t>Boa organização</a:t>
             </a:r>
           </a:p>
         </p:txBody>
@@ -12902,7 +12903,7 @@
         </p:nvSpPr>
         <p:spPr>
           <a:xfrm>
-            <a:off x="783771" y="1363869"/>
+            <a:off x="783771" y="1451795"/>
             <a:ext cx="5547360" cy="2139528"/>
           </a:xfrm>
           <a:prstGeom prst="wedgeEllipseCallout">
@@ -12930,14 +12931,17 @@
           <a:lstStyle/>
           <a:p>
             <a:pPr algn="ctr"/>
+            <a:endParaRPr lang="pt-BR" sz="3600" dirty="0"/>
+          </a:p>
+          <a:p>
+            <a:pPr algn="ctr"/>
             <a:r>
-              <a:rPr lang="pt-BR" sz="4800" dirty="0"/>
-              <a:t>QUE FORMULÁRIO CHATO </a:t>
+              <a:rPr lang="pt-BR" sz="3200" dirty="0"/>
+              <a:t>Faculdade de tecnologia sem tecnologia não faz sentido</a:t>
             </a:r>
-            <a:r>
-              <a:rPr lang="pt-BR" sz="2000" dirty="0"/>
-              <a:t>10x</a:t>
-            </a:r>
+          </a:p>
+          <a:p>
+            <a:pPr algn="ctr"/>
             <a:endParaRPr lang="pt-BR" sz="4800" dirty="0"/>
           </a:p>
         </p:txBody>
@@ -12956,8 +12960,8 @@
         </p:nvSpPr>
         <p:spPr>
           <a:xfrm>
-            <a:off x="5172891" y="3506311"/>
-            <a:ext cx="2316480" cy="1325880"/>
+            <a:off x="6100149" y="2714018"/>
+            <a:ext cx="3283130" cy="1626875"/>
           </a:xfrm>
           <a:prstGeom prst="cloudCallout">
             <a:avLst/>
@@ -12985,8 +12989,8 @@
           <a:p>
             <a:pPr algn="ctr"/>
             <a:r>
-              <a:rPr lang="pt-BR" dirty="0"/>
-              <a:t>Não sei o que é RE..</a:t>
+              <a:rPr lang="pt-BR" sz="2000" dirty="0"/>
+              <a:t>Devemos pensar nas condições sociais das pessoas </a:t>
             </a:r>
           </a:p>
         </p:txBody>
@@ -13034,14 +13038,9 @@
           <a:p>
             <a:pPr algn="ctr"/>
             <a:r>
-              <a:rPr lang="pt-BR" sz="4800" dirty="0"/>
-              <a:t>CONSEGUI FAZER 8</a:t>
+              <a:rPr lang="pt-BR" sz="4000" dirty="0"/>
+              <a:t>Muito ruim ter que anotar no papel</a:t>
             </a:r>
-            <a:r>
-              <a:rPr lang="pt-BR" sz="2000" dirty="0"/>
-              <a:t>x</a:t>
-            </a:r>
-            <a:endParaRPr lang="pt-BR" sz="4800" dirty="0"/>
           </a:p>
         </p:txBody>
       </p:sp>
@@ -13387,8 +13386,13 @@
           <a:p>
             <a:r>
               <a:rPr lang="pt-BR" dirty="0"/>
-              <a:t>5. Jornada – Simplificada</a:t>
+              <a:t>5. Jornada – Sistema da </a:t>
             </a:r>
+            <a:r>
+              <a:rPr lang="pt-BR" dirty="0" err="1"/>
+              <a:t>Bandtec</a:t>
+            </a:r>
+            <a:endParaRPr lang="pt-BR" dirty="0"/>
           </a:p>
         </p:txBody>
       </p:sp>
@@ -13833,6 +13837,479 @@
                 <a:defRPr/>
               </a:pPr>
               <a:t>17</a:t>
+            </a:fld>
+            <a:endParaRPr lang="pt-BR" sz="880" dirty="0"/>
+          </a:p>
+        </p:txBody>
+      </p:sp>
+      <p:sp>
+        <p:nvSpPr>
+          <p:cNvPr id="4" name="Espaço Reservado para Texto 3"/>
+          <p:cNvSpPr>
+            <a:spLocks noGrp="1"/>
+          </p:cNvSpPr>
+          <p:nvPr>
+            <p:ph type="body" sz="quarter" idx="13"/>
+          </p:nvPr>
+        </p:nvSpPr>
+        <p:spPr/>
+        <p:txBody>
+          <a:bodyPr/>
+          <a:lstStyle/>
+          <a:p>
+            <a:r>
+              <a:rPr lang="pt-BR" dirty="0"/>
+              <a:t>5. Jornada – Software </a:t>
+            </a:r>
+            <a:r>
+              <a:rPr lang="pt-BR" dirty="0" err="1"/>
+              <a:t>Philos</a:t>
+            </a:r>
+            <a:endParaRPr lang="pt-BR" dirty="0"/>
+          </a:p>
+        </p:txBody>
+      </p:sp>
+      <p:pic>
+        <p:nvPicPr>
+          <p:cNvPr id="20" name="Gráfico 19" descr="Rosto sorridente sem preenchimento ">
+            <a:extLst>
+              <a:ext uri="{FF2B5EF4-FFF2-40B4-BE49-F238E27FC236}">
+                <a16:creationId xmlns:a16="http://schemas.microsoft.com/office/drawing/2014/main" id="{E80A76F0-62DA-4619-BD72-04AC9A4D238E}"/>
+              </a:ext>
+            </a:extLst>
+          </p:cNvPr>
+          <p:cNvPicPr>
+            <a:picLocks noChangeAspect="1"/>
+          </p:cNvPicPr>
+          <p:nvPr/>
+        </p:nvPicPr>
+        <p:blipFill>
+          <a:blip r:embed="rId2">
+            <a:extLst>
+              <a:ext uri="{28A0092B-C50C-407E-A947-70E740481C1C}">
+                <a14:useLocalDpi xmlns:a14="http://schemas.microsoft.com/office/drawing/2010/main"/>
+              </a:ext>
+              <a:ext uri="{96DAC541-7B7A-43D3-8B79-37D633B846F1}">
+                <asvg:svgBlip xmlns:asvg="http://schemas.microsoft.com/office/drawing/2016/SVG/main" r:embed="rId3"/>
+              </a:ext>
+            </a:extLst>
+          </a:blip>
+          <a:stretch>
+            <a:fillRect/>
+          </a:stretch>
+        </p:blipFill>
+        <p:spPr>
+          <a:xfrm>
+            <a:off x="13666128" y="4111970"/>
+            <a:ext cx="914400" cy="914400"/>
+          </a:xfrm>
+          <a:prstGeom prst="rect">
+            <a:avLst/>
+          </a:prstGeom>
+        </p:spPr>
+      </p:pic>
+      <p:pic>
+        <p:nvPicPr>
+          <p:cNvPr id="22" name="Gráfico 21" descr="Rosto neutro sem preenchimento ">
+            <a:extLst>
+              <a:ext uri="{FF2B5EF4-FFF2-40B4-BE49-F238E27FC236}">
+                <a16:creationId xmlns:a16="http://schemas.microsoft.com/office/drawing/2014/main" id="{2C27A70E-C36E-4254-A687-402AE3A162C4}"/>
+              </a:ext>
+            </a:extLst>
+          </p:cNvPr>
+          <p:cNvPicPr>
+            <a:picLocks noChangeAspect="1"/>
+          </p:cNvPicPr>
+          <p:nvPr/>
+        </p:nvPicPr>
+        <p:blipFill>
+          <a:blip r:embed="rId4">
+            <a:extLst>
+              <a:ext uri="{28A0092B-C50C-407E-A947-70E740481C1C}">
+                <a14:useLocalDpi xmlns:a14="http://schemas.microsoft.com/office/drawing/2010/main"/>
+              </a:ext>
+              <a:ext uri="{96DAC541-7B7A-43D3-8B79-37D633B846F1}">
+                <asvg:svgBlip xmlns:asvg="http://schemas.microsoft.com/office/drawing/2016/SVG/main" r:embed="rId5"/>
+              </a:ext>
+            </a:extLst>
+          </a:blip>
+          <a:stretch>
+            <a:fillRect/>
+          </a:stretch>
+        </p:blipFill>
+        <p:spPr>
+          <a:xfrm>
+            <a:off x="13666128" y="3097033"/>
+            <a:ext cx="914400" cy="914400"/>
+          </a:xfrm>
+          <a:prstGeom prst="rect">
+            <a:avLst/>
+          </a:prstGeom>
+        </p:spPr>
+      </p:pic>
+      <p:pic>
+        <p:nvPicPr>
+          <p:cNvPr id="24" name="Gráfico 23" descr="Rosto triste sem preenchimento ">
+            <a:extLst>
+              <a:ext uri="{FF2B5EF4-FFF2-40B4-BE49-F238E27FC236}">
+                <a16:creationId xmlns:a16="http://schemas.microsoft.com/office/drawing/2014/main" id="{B805637B-3BD1-444D-B19B-DD46F785575B}"/>
+              </a:ext>
+            </a:extLst>
+          </p:cNvPr>
+          <p:cNvPicPr>
+            <a:picLocks noChangeAspect="1"/>
+          </p:cNvPicPr>
+          <p:nvPr/>
+        </p:nvPicPr>
+        <p:blipFill>
+          <a:blip r:embed="rId6">
+            <a:extLst>
+              <a:ext uri="{28A0092B-C50C-407E-A947-70E740481C1C}">
+                <a14:useLocalDpi xmlns:a14="http://schemas.microsoft.com/office/drawing/2010/main"/>
+              </a:ext>
+              <a:ext uri="{96DAC541-7B7A-43D3-8B79-37D633B846F1}">
+                <asvg:svgBlip xmlns:asvg="http://schemas.microsoft.com/office/drawing/2016/SVG/main" r:embed="rId7"/>
+              </a:ext>
+            </a:extLst>
+          </a:blip>
+          <a:stretch>
+            <a:fillRect/>
+          </a:stretch>
+        </p:blipFill>
+        <p:spPr>
+          <a:xfrm>
+            <a:off x="13666128" y="2119616"/>
+            <a:ext cx="914400" cy="914400"/>
+          </a:xfrm>
+          <a:prstGeom prst="rect">
+            <a:avLst/>
+          </a:prstGeom>
+        </p:spPr>
+      </p:pic>
+      <p:pic>
+        <p:nvPicPr>
+          <p:cNvPr id="26" name="Gráfico 25" descr="Rosto sorrindo sem preenchimento ">
+            <a:extLst>
+              <a:ext uri="{FF2B5EF4-FFF2-40B4-BE49-F238E27FC236}">
+                <a16:creationId xmlns:a16="http://schemas.microsoft.com/office/drawing/2014/main" id="{A5F4DB79-35CD-4BA7-B77B-3031D31D50BC}"/>
+              </a:ext>
+            </a:extLst>
+          </p:cNvPr>
+          <p:cNvPicPr>
+            <a:picLocks noChangeAspect="1"/>
+          </p:cNvPicPr>
+          <p:nvPr/>
+        </p:nvPicPr>
+        <p:blipFill>
+          <a:blip r:embed="rId8">
+            <a:extLst>
+              <a:ext uri="{28A0092B-C50C-407E-A947-70E740481C1C}">
+                <a14:useLocalDpi xmlns:a14="http://schemas.microsoft.com/office/drawing/2010/main"/>
+              </a:ext>
+              <a:ext uri="{96DAC541-7B7A-43D3-8B79-37D633B846F1}">
+                <asvg:svgBlip xmlns:asvg="http://schemas.microsoft.com/office/drawing/2016/SVG/main" r:embed="rId9"/>
+              </a:ext>
+            </a:extLst>
+          </a:blip>
+          <a:stretch>
+            <a:fillRect/>
+          </a:stretch>
+        </p:blipFill>
+        <p:spPr>
+          <a:xfrm>
+            <a:off x="13666128" y="1138405"/>
+            <a:ext cx="914400" cy="914400"/>
+          </a:xfrm>
+          <a:prstGeom prst="rect">
+            <a:avLst/>
+          </a:prstGeom>
+        </p:spPr>
+      </p:pic>
+      <p:pic>
+        <p:nvPicPr>
+          <p:cNvPr id="29" name="Gráfico 28" descr="Rosto sorridente sem preenchimento ">
+            <a:extLst>
+              <a:ext uri="{FF2B5EF4-FFF2-40B4-BE49-F238E27FC236}">
+                <a16:creationId xmlns:a16="http://schemas.microsoft.com/office/drawing/2014/main" id="{19B3DCB4-A744-41A9-9082-4FA04F7F8229}"/>
+              </a:ext>
+            </a:extLst>
+          </p:cNvPr>
+          <p:cNvPicPr>
+            <a:picLocks noChangeAspect="1"/>
+          </p:cNvPicPr>
+          <p:nvPr/>
+        </p:nvPicPr>
+        <p:blipFill>
+          <a:blip r:embed="rId2">
+            <a:extLst>
+              <a:ext uri="{28A0092B-C50C-407E-A947-70E740481C1C}">
+                <a14:useLocalDpi xmlns:a14="http://schemas.microsoft.com/office/drawing/2010/main"/>
+              </a:ext>
+              <a:ext uri="{96DAC541-7B7A-43D3-8B79-37D633B846F1}">
+                <asvg:svgBlip xmlns:asvg="http://schemas.microsoft.com/office/drawing/2016/SVG/main" r:embed="rId3"/>
+              </a:ext>
+            </a:extLst>
+          </a:blip>
+          <a:stretch>
+            <a:fillRect/>
+          </a:stretch>
+        </p:blipFill>
+        <p:spPr>
+          <a:xfrm>
+            <a:off x="13666128" y="5118858"/>
+            <a:ext cx="914400" cy="914400"/>
+          </a:xfrm>
+          <a:prstGeom prst="rect">
+            <a:avLst/>
+          </a:prstGeom>
+        </p:spPr>
+      </p:pic>
+      <p:pic>
+        <p:nvPicPr>
+          <p:cNvPr id="39" name="Gráfico 38" descr="Envelope">
+            <a:extLst>
+              <a:ext uri="{FF2B5EF4-FFF2-40B4-BE49-F238E27FC236}">
+                <a16:creationId xmlns:a16="http://schemas.microsoft.com/office/drawing/2014/main" id="{62A3CC72-CA54-4AF6-9589-41B8F7A3737B}"/>
+              </a:ext>
+            </a:extLst>
+          </p:cNvPr>
+          <p:cNvPicPr>
+            <a:picLocks noChangeAspect="1"/>
+          </p:cNvPicPr>
+          <p:nvPr/>
+        </p:nvPicPr>
+        <p:blipFill>
+          <a:blip r:embed="rId10">
+            <a:extLst>
+              <a:ext uri="{28A0092B-C50C-407E-A947-70E740481C1C}">
+                <a14:useLocalDpi xmlns:a14="http://schemas.microsoft.com/office/drawing/2010/main"/>
+              </a:ext>
+              <a:ext uri="{96DAC541-7B7A-43D3-8B79-37D633B846F1}">
+                <asvg:svgBlip xmlns:asvg="http://schemas.microsoft.com/office/drawing/2016/SVG/main" r:embed="rId11"/>
+              </a:ext>
+            </a:extLst>
+          </a:blip>
+          <a:stretch>
+            <a:fillRect/>
+          </a:stretch>
+        </p:blipFill>
+        <p:spPr>
+          <a:xfrm>
+            <a:off x="-1690025" y="125114"/>
+            <a:ext cx="914400" cy="914400"/>
+          </a:xfrm>
+          <a:prstGeom prst="rect">
+            <a:avLst/>
+          </a:prstGeom>
+        </p:spPr>
+      </p:pic>
+      <p:pic>
+        <p:nvPicPr>
+          <p:cNvPr id="45" name="Gráfico 44" descr="Baixar da nuvem">
+            <a:extLst>
+              <a:ext uri="{FF2B5EF4-FFF2-40B4-BE49-F238E27FC236}">
+                <a16:creationId xmlns:a16="http://schemas.microsoft.com/office/drawing/2014/main" id="{8CABD450-B3F5-45F7-93DB-C43B2193D821}"/>
+              </a:ext>
+            </a:extLst>
+          </p:cNvPr>
+          <p:cNvPicPr>
+            <a:picLocks noChangeAspect="1"/>
+          </p:cNvPicPr>
+          <p:nvPr/>
+        </p:nvPicPr>
+        <p:blipFill>
+          <a:blip r:embed="rId12">
+            <a:extLst>
+              <a:ext uri="{28A0092B-C50C-407E-A947-70E740481C1C}">
+                <a14:useLocalDpi xmlns:a14="http://schemas.microsoft.com/office/drawing/2010/main"/>
+              </a:ext>
+              <a:ext uri="{96DAC541-7B7A-43D3-8B79-37D633B846F1}">
+                <asvg:svgBlip xmlns:asvg="http://schemas.microsoft.com/office/drawing/2016/SVG/main" r:embed="rId13"/>
+              </a:ext>
+            </a:extLst>
+          </a:blip>
+          <a:stretch>
+            <a:fillRect/>
+          </a:stretch>
+        </p:blipFill>
+        <p:spPr>
+          <a:xfrm>
+            <a:off x="-1739701" y="3034016"/>
+            <a:ext cx="914400" cy="914400"/>
+          </a:xfrm>
+          <a:prstGeom prst="rect">
+            <a:avLst/>
+          </a:prstGeom>
+        </p:spPr>
+      </p:pic>
+      <p:pic>
+        <p:nvPicPr>
+          <p:cNvPr id="47" name="Gráfico 46" descr="Call center">
+            <a:extLst>
+              <a:ext uri="{FF2B5EF4-FFF2-40B4-BE49-F238E27FC236}">
+                <a16:creationId xmlns:a16="http://schemas.microsoft.com/office/drawing/2014/main" id="{233C002F-C1FF-404F-84F0-8020562F896F}"/>
+              </a:ext>
+            </a:extLst>
+          </p:cNvPr>
+          <p:cNvPicPr>
+            <a:picLocks noChangeAspect="1"/>
+          </p:cNvPicPr>
+          <p:nvPr/>
+        </p:nvPicPr>
+        <p:blipFill>
+          <a:blip r:embed="rId14">
+            <a:extLst>
+              <a:ext uri="{28A0092B-C50C-407E-A947-70E740481C1C}">
+                <a14:useLocalDpi xmlns:a14="http://schemas.microsoft.com/office/drawing/2010/main"/>
+              </a:ext>
+              <a:ext uri="{96DAC541-7B7A-43D3-8B79-37D633B846F1}">
+                <asvg:svgBlip xmlns:asvg="http://schemas.microsoft.com/office/drawing/2016/SVG/main" r:embed="rId15"/>
+              </a:ext>
+            </a:extLst>
+          </a:blip>
+          <a:stretch>
+            <a:fillRect/>
+          </a:stretch>
+        </p:blipFill>
+        <p:spPr>
+          <a:xfrm>
+            <a:off x="-1739701" y="1029172"/>
+            <a:ext cx="914400" cy="914400"/>
+          </a:xfrm>
+          <a:prstGeom prst="rect">
+            <a:avLst/>
+          </a:prstGeom>
+        </p:spPr>
+      </p:pic>
+      <p:pic>
+        <p:nvPicPr>
+          <p:cNvPr id="49" name="Gráfico 48" descr="Fala">
+            <a:extLst>
+              <a:ext uri="{FF2B5EF4-FFF2-40B4-BE49-F238E27FC236}">
+                <a16:creationId xmlns:a16="http://schemas.microsoft.com/office/drawing/2014/main" id="{C69E2FC7-FB44-43AA-BDD0-82B2130C6EE2}"/>
+              </a:ext>
+            </a:extLst>
+          </p:cNvPr>
+          <p:cNvPicPr>
+            <a:picLocks noChangeAspect="1"/>
+          </p:cNvPicPr>
+          <p:nvPr/>
+        </p:nvPicPr>
+        <p:blipFill>
+          <a:blip r:embed="rId16">
+            <a:extLst>
+              <a:ext uri="{28A0092B-C50C-407E-A947-70E740481C1C}">
+                <a14:useLocalDpi xmlns:a14="http://schemas.microsoft.com/office/drawing/2010/main"/>
+              </a:ext>
+              <a:ext uri="{96DAC541-7B7A-43D3-8B79-37D633B846F1}">
+                <asvg:svgBlip xmlns:asvg="http://schemas.microsoft.com/office/drawing/2016/SVG/main" r:embed="rId17"/>
+              </a:ext>
+            </a:extLst>
+          </a:blip>
+          <a:stretch>
+            <a:fillRect/>
+          </a:stretch>
+        </p:blipFill>
+        <p:spPr>
+          <a:xfrm>
+            <a:off x="-1739701" y="2119616"/>
+            <a:ext cx="914400" cy="914400"/>
+          </a:xfrm>
+          <a:prstGeom prst="rect">
+            <a:avLst/>
+          </a:prstGeom>
+        </p:spPr>
+      </p:pic>
+      <p:pic>
+        <p:nvPicPr>
+          <p:cNvPr id="6" name="Imagem 5" descr="Interface gráfica do usuário, Aplicativo, Tabela&#10;&#10;Descrição gerada automaticamente">
+            <a:extLst>
+              <a:ext uri="{FF2B5EF4-FFF2-40B4-BE49-F238E27FC236}">
+                <a16:creationId xmlns:a16="http://schemas.microsoft.com/office/drawing/2014/main" id="{236A4922-BE11-48A5-B805-57B57003E033}"/>
+              </a:ext>
+            </a:extLst>
+          </p:cNvPr>
+          <p:cNvPicPr>
+            <a:picLocks noChangeAspect="1"/>
+          </p:cNvPicPr>
+          <p:nvPr/>
+        </p:nvPicPr>
+        <p:blipFill>
+          <a:blip r:embed="rId18">
+            <a:extLst>
+              <a:ext uri="{28A0092B-C50C-407E-A947-70E740481C1C}">
+                <a14:useLocalDpi xmlns:a14="http://schemas.microsoft.com/office/drawing/2010/main" val="0"/>
+              </a:ext>
+            </a:extLst>
+          </a:blip>
+          <a:stretch>
+            <a:fillRect/>
+          </a:stretch>
+        </p:blipFill>
+        <p:spPr>
+          <a:xfrm>
+            <a:off x="286439" y="1846786"/>
+            <a:ext cx="12870071" cy="3867690"/>
+          </a:xfrm>
+          <a:prstGeom prst="rect">
+            <a:avLst/>
+          </a:prstGeom>
+        </p:spPr>
+      </p:pic>
+    </p:spTree>
+    <p:extLst>
+      <p:ext uri="{BB962C8B-B14F-4D97-AF65-F5344CB8AC3E}">
+        <p14:creationId xmlns:p14="http://schemas.microsoft.com/office/powerpoint/2010/main" val="3425363226"/>
+      </p:ext>
+    </p:extLst>
+  </p:cSld>
+  <p:clrMapOvr>
+    <a:masterClrMapping/>
+  </p:clrMapOvr>
+</p:sld>
+</file>
+
+<file path=ppt/slides/slide18.xml><?xml version="1.0" encoding="utf-8"?>
+<p:sld xmlns:a="http://schemas.openxmlformats.org/drawingml/2006/main" xmlns:r="http://schemas.openxmlformats.org/officeDocument/2006/relationships" xmlns:p="http://schemas.openxmlformats.org/presentationml/2006/main">
+  <p:cSld>
+    <p:spTree>
+      <p:nvGrpSpPr>
+        <p:cNvPr id="1" name=""/>
+        <p:cNvGrpSpPr/>
+        <p:nvPr/>
+      </p:nvGrpSpPr>
+      <p:grpSpPr>
+        <a:xfrm>
+          <a:off x="0" y="0"/>
+          <a:ext cx="0" cy="0"/>
+          <a:chOff x="0" y="0"/>
+          <a:chExt cx="0" cy="0"/>
+        </a:xfrm>
+      </p:grpSpPr>
+      <p:sp>
+        <p:nvSpPr>
+          <p:cNvPr id="3" name="Espaço Reservado para Número de Slide 2"/>
+          <p:cNvSpPr>
+            <a:spLocks noGrp="1"/>
+          </p:cNvSpPr>
+          <p:nvPr>
+            <p:ph type="sldNum" sz="quarter" idx="4"/>
+          </p:nvPr>
+        </p:nvSpPr>
+        <p:spPr/>
+        <p:txBody>
+          <a:bodyPr/>
+          <a:lstStyle/>
+          <a:p>
+            <a:pPr>
+              <a:defRPr/>
+            </a:pPr>
+            <a:fld id="{B66251D2-9488-44CD-87B4-F793A73C4A01}" type="slidenum">
+              <a:rPr lang="pt-BR" smtClean="0"/>
+              <a:pPr>
+                <a:defRPr/>
+              </a:pPr>
+              <a:t>18</a:t>
             </a:fld>
             <a:endParaRPr lang="pt-BR" sz="880" dirty="0"/>
           </a:p>
@@ -19754,6 +20231,12 @@
 </file>
 
 <file path=customXml/item1.xml><?xml version="1.0" encoding="utf-8"?>
+<p:properties xmlns:p="http://schemas.microsoft.com/office/2006/metadata/properties" xmlns:xsi="http://www.w3.org/2001/XMLSchema-instance" xmlns:pc="http://schemas.microsoft.com/office/infopath/2007/PartnerControls">
+  <documentManagement/>
+</p:properties>
+</file>
+
+<file path=customXml/item2.xml><?xml version="1.0" encoding="utf-8"?>
 <ct:contentTypeSchema xmlns:ct="http://schemas.microsoft.com/office/2006/metadata/contentType" xmlns:ma="http://schemas.microsoft.com/office/2006/metadata/properties/metaAttributes" ct:_="" ma:_="" ma:contentTypeName="Document" ma:contentTypeID="0x0101001132905C37EA9847A7207C4BBCCCD8F4" ma:contentTypeVersion="13" ma:contentTypeDescription="Create a new document." ma:contentTypeScope="" ma:versionID="0fa59793b99d27e1e0b856ab72ac2f0d">
   <xsd:schema xmlns:xsd="http://www.w3.org/2001/XMLSchema" xmlns:xs="http://www.w3.org/2001/XMLSchema" xmlns:p="http://schemas.microsoft.com/office/2006/metadata/properties" xmlns:ns3="4327b14a-fe89-488e-9f6d-9658cacf372b" xmlns:ns4="bbcd8c33-6940-4d4c-a587-bbc736ca1e4d" targetNamespace="http://schemas.microsoft.com/office/2006/metadata/properties" ma:root="true" ma:fieldsID="01494effa1b4414faf4d9851fe547c93" ns3:_="" ns4:_="">
     <xsd:import namespace="4327b14a-fe89-488e-9f6d-9658cacf372b"/>
@@ -19976,12 +20459,6 @@
 </ct:contentTypeSchema>
 </file>
 
-<file path=customXml/item2.xml><?xml version="1.0" encoding="utf-8"?>
-<p:properties xmlns:p="http://schemas.microsoft.com/office/2006/metadata/properties" xmlns:xsi="http://www.w3.org/2001/XMLSchema-instance" xmlns:pc="http://schemas.microsoft.com/office/infopath/2007/PartnerControls">
-  <documentManagement/>
-</p:properties>
-</file>
-
 <file path=customXml/item3.xml><?xml version="1.0" encoding="utf-8"?>
 <?mso-contentType ?>
 <FormTemplates xmlns="http://schemas.microsoft.com/sharepoint/v3/contenttype/forms">
@@ -19992,6 +20469,23 @@
 </file>
 
 <file path=customXml/itemProps1.xml><?xml version="1.0" encoding="utf-8"?>
+<ds:datastoreItem xmlns:ds="http://schemas.openxmlformats.org/officeDocument/2006/customXml" ds:itemID="{08323129-B204-40D5-AFF8-9C9A9BF3922E}">
+  <ds:schemaRefs>
+    <ds:schemaRef ds:uri="http://purl.org/dc/terms/"/>
+    <ds:schemaRef ds:uri="http://purl.org/dc/dcmitype/"/>
+    <ds:schemaRef ds:uri="http://schemas.microsoft.com/office/infopath/2007/PartnerControls"/>
+    <ds:schemaRef ds:uri="http://schemas.openxmlformats.org/package/2006/metadata/core-properties"/>
+    <ds:schemaRef ds:uri="http://purl.org/dc/elements/1.1/"/>
+    <ds:schemaRef ds:uri="bbcd8c33-6940-4d4c-a587-bbc736ca1e4d"/>
+    <ds:schemaRef ds:uri="http://schemas.microsoft.com/office/2006/documentManagement/types"/>
+    <ds:schemaRef ds:uri="4327b14a-fe89-488e-9f6d-9658cacf372b"/>
+    <ds:schemaRef ds:uri="http://schemas.microsoft.com/office/2006/metadata/properties"/>
+    <ds:schemaRef ds:uri="http://www.w3.org/XML/1998/namespace"/>
+  </ds:schemaRefs>
+</ds:datastoreItem>
+</file>
+
+<file path=customXml/itemProps2.xml><?xml version="1.0" encoding="utf-8"?>
 <ds:datastoreItem xmlns:ds="http://schemas.openxmlformats.org/officeDocument/2006/customXml" ds:itemID="{6DE4A8B5-68AC-4B03-B2A1-E04BE1806673}">
   <ds:schemaRefs>
     <ds:schemaRef ds:uri="http://schemas.microsoft.com/office/2006/metadata/contentType"/>
@@ -20010,23 +20504,6 @@
 </ds:datastoreItem>
 </file>
 
-<file path=customXml/itemProps2.xml><?xml version="1.0" encoding="utf-8"?>
-<ds:datastoreItem xmlns:ds="http://schemas.openxmlformats.org/officeDocument/2006/customXml" ds:itemID="{08323129-B204-40D5-AFF8-9C9A9BF3922E}">
-  <ds:schemaRefs>
-    <ds:schemaRef ds:uri="http://purl.org/dc/terms/"/>
-    <ds:schemaRef ds:uri="http://purl.org/dc/dcmitype/"/>
-    <ds:schemaRef ds:uri="http://schemas.microsoft.com/office/infopath/2007/PartnerControls"/>
-    <ds:schemaRef ds:uri="http://schemas.openxmlformats.org/package/2006/metadata/core-properties"/>
-    <ds:schemaRef ds:uri="http://purl.org/dc/elements/1.1/"/>
-    <ds:schemaRef ds:uri="bbcd8c33-6940-4d4c-a587-bbc736ca1e4d"/>
-    <ds:schemaRef ds:uri="http://schemas.microsoft.com/office/2006/documentManagement/types"/>
-    <ds:schemaRef ds:uri="4327b14a-fe89-488e-9f6d-9658cacf372b"/>
-    <ds:schemaRef ds:uri="http://schemas.microsoft.com/office/2006/metadata/properties"/>
-    <ds:schemaRef ds:uri="http://www.w3.org/XML/1998/namespace"/>
-  </ds:schemaRefs>
-</ds:datastoreItem>
-</file>
-
 <file path=customXml/itemProps3.xml><?xml version="1.0" encoding="utf-8"?>
 <ds:datastoreItem xmlns:ds="http://schemas.openxmlformats.org/officeDocument/2006/customXml" ds:itemID="{C5C26249-539D-4496-936B-3CD83A43905E}">
   <ds:schemaRefs>

</xml_diff>